<commit_message>
Test extractSentence Make Presentation data
</commit_message>
<xml_diff>
--- a/SW presentation.pptx
+++ b/SW presentation.pptx
@@ -6,16 +6,24 @@
   </p:sldMasterIdLst>
   <p:sldIdLst>
     <p:sldId id="256" r:id="rId2"/>
-    <p:sldId id="266" r:id="rId3"/>
-    <p:sldId id="257" r:id="rId4"/>
-    <p:sldId id="262" r:id="rId5"/>
-    <p:sldId id="258" r:id="rId6"/>
-    <p:sldId id="259" r:id="rId7"/>
-    <p:sldId id="260" r:id="rId8"/>
-    <p:sldId id="261" r:id="rId9"/>
-    <p:sldId id="264" r:id="rId10"/>
-    <p:sldId id="265" r:id="rId11"/>
-    <p:sldId id="263" r:id="rId12"/>
+    <p:sldId id="268" r:id="rId3"/>
+    <p:sldId id="266" r:id="rId4"/>
+    <p:sldId id="257" r:id="rId5"/>
+    <p:sldId id="262" r:id="rId6"/>
+    <p:sldId id="258" r:id="rId7"/>
+    <p:sldId id="259" r:id="rId8"/>
+    <p:sldId id="260" r:id="rId9"/>
+    <p:sldId id="261" r:id="rId10"/>
+    <p:sldId id="264" r:id="rId11"/>
+    <p:sldId id="265" r:id="rId12"/>
+    <p:sldId id="263" r:id="rId13"/>
+    <p:sldId id="267" r:id="rId14"/>
+    <p:sldId id="272" r:id="rId15"/>
+    <p:sldId id="270" r:id="rId16"/>
+    <p:sldId id="273" r:id="rId17"/>
+    <p:sldId id="269" r:id="rId18"/>
+    <p:sldId id="275" r:id="rId19"/>
+    <p:sldId id="274" r:id="rId20"/>
   </p:sldIdLst>
   <p:sldSz cx="12192000" cy="6858000"/>
   <p:notesSz cx="6858000" cy="9144000"/>
@@ -2968,7 +2976,7 @@
           <a:effectLst/>
           <a:extLst>
             <a:ext uri="{91240B29-F687-4f45-9708-019B960494DF}">
-              <a14:hiddenLine xmlns:a14="http://schemas.microsoft.com/office/drawing/2010/main" xmlns="" w="9525">
+              <a14:hiddenLine xmlns="" xmlns:a14="http://schemas.microsoft.com/office/drawing/2010/main" w="9525">
                 <a:solidFill>
                   <a:srgbClr val="000000"/>
                 </a:solidFill>
@@ -3160,7 +3168,7 @@
           <a:p>
             <a:fld id="{7C67DB7F-CC58-48E2-BE0E-8BA189DDF264}" type="datetimeFigureOut">
               <a:rPr lang="ko-KR" altLang="en-US" smtClean="0"/>
-              <a:t>2017-10-29</a:t>
+              <a:t>2017-11-14</a:t>
             </a:fld>
             <a:endParaRPr lang="ko-KR" altLang="en-US"/>
           </a:p>
@@ -3478,7 +3486,7 @@
           <a:p>
             <a:fld id="{7C67DB7F-CC58-48E2-BE0E-8BA189DDF264}" type="datetimeFigureOut">
               <a:rPr lang="ko-KR" altLang="en-US" smtClean="0"/>
-              <a:t>2017-10-29</a:t>
+              <a:t>2017-11-14</a:t>
             </a:fld>
             <a:endParaRPr lang="ko-KR" altLang="en-US"/>
           </a:p>
@@ -3966,7 +3974,7 @@
           <a:p>
             <a:fld id="{7C67DB7F-CC58-48E2-BE0E-8BA189DDF264}" type="datetimeFigureOut">
               <a:rPr lang="ko-KR" altLang="en-US" smtClean="0"/>
-              <a:t>2017-10-29</a:t>
+              <a:t>2017-11-14</a:t>
             </a:fld>
             <a:endParaRPr lang="ko-KR" altLang="en-US"/>
           </a:p>
@@ -4335,7 +4343,7 @@
           <a:p>
             <a:fld id="{7C67DB7F-CC58-48E2-BE0E-8BA189DDF264}" type="datetimeFigureOut">
               <a:rPr lang="ko-KR" altLang="en-US" smtClean="0"/>
-              <a:t>2017-10-29</a:t>
+              <a:t>2017-11-14</a:t>
             </a:fld>
             <a:endParaRPr lang="ko-KR" altLang="en-US"/>
           </a:p>
@@ -4490,7 +4498,7 @@
           <a:ln/>
           <a:extLst>
             <a:ext uri="{91240B29-F687-4f45-9708-019B960494DF}">
-              <a14:hiddenLine xmlns:a14="http://schemas.microsoft.com/office/drawing/2010/main" xmlns="" w="9525">
+              <a14:hiddenLine xmlns="" xmlns:a14="http://schemas.microsoft.com/office/drawing/2010/main" w="9525">
                 <a:solidFill>
                   <a:srgbClr val="000000"/>
                 </a:solidFill>
@@ -4608,7 +4616,7 @@
           <a:p>
             <a:fld id="{7C67DB7F-CC58-48E2-BE0E-8BA189DDF264}" type="datetimeFigureOut">
               <a:rPr lang="ko-KR" altLang="en-US" smtClean="0"/>
-              <a:t>2017-10-29</a:t>
+              <a:t>2017-11-14</a:t>
             </a:fld>
             <a:endParaRPr lang="ko-KR" altLang="en-US"/>
           </a:p>
@@ -4765,7 +4773,7 @@
           <a:ln/>
           <a:extLst>
             <a:ext uri="{91240B29-F687-4f45-9708-019B960494DF}">
-              <a14:hiddenLine xmlns:a14="http://schemas.microsoft.com/office/drawing/2010/main" xmlns="" w="9525">
+              <a14:hiddenLine xmlns="" xmlns:a14="http://schemas.microsoft.com/office/drawing/2010/main" w="9525">
                 <a:solidFill>
                   <a:srgbClr val="000000"/>
                 </a:solidFill>
@@ -4893,7 +4901,7 @@
           <a:p>
             <a:fld id="{7C67DB7F-CC58-48E2-BE0E-8BA189DDF264}" type="datetimeFigureOut">
               <a:rPr lang="ko-KR" altLang="en-US" smtClean="0"/>
-              <a:t>2017-10-29</a:t>
+              <a:t>2017-11-14</a:t>
             </a:fld>
             <a:endParaRPr lang="ko-KR" altLang="en-US"/>
           </a:p>
@@ -5048,7 +5056,7 @@
           <a:ln/>
           <a:extLst>
             <a:ext uri="{91240B29-F687-4f45-9708-019B960494DF}">
-              <a14:hiddenLine xmlns:a14="http://schemas.microsoft.com/office/drawing/2010/main" xmlns="" w="9525">
+              <a14:hiddenLine xmlns="" xmlns:a14="http://schemas.microsoft.com/office/drawing/2010/main" w="9525">
                 <a:solidFill>
                   <a:srgbClr val="000000"/>
                 </a:solidFill>
@@ -5176,7 +5184,7 @@
           <a:p>
             <a:fld id="{7C67DB7F-CC58-48E2-BE0E-8BA189DDF264}" type="datetimeFigureOut">
               <a:rPr lang="ko-KR" altLang="en-US" smtClean="0"/>
-              <a:t>2017-10-29</a:t>
+              <a:t>2017-11-14</a:t>
             </a:fld>
             <a:endParaRPr lang="ko-KR" altLang="en-US"/>
           </a:p>
@@ -5519,7 +5527,7 @@
           <a:p>
             <a:fld id="{7C67DB7F-CC58-48E2-BE0E-8BA189DDF264}" type="datetimeFigureOut">
               <a:rPr lang="ko-KR" altLang="en-US" smtClean="0"/>
-              <a:t>2017-10-29</a:t>
+              <a:t>2017-11-14</a:t>
             </a:fld>
             <a:endParaRPr lang="ko-KR" altLang="en-US"/>
           </a:p>
@@ -5674,7 +5682,7 @@
           <a:ln/>
           <a:extLst>
             <a:ext uri="{91240B29-F687-4f45-9708-019B960494DF}">
-              <a14:hiddenLine xmlns:a14="http://schemas.microsoft.com/office/drawing/2010/main" xmlns="" w="9525">
+              <a14:hiddenLine xmlns="" xmlns:a14="http://schemas.microsoft.com/office/drawing/2010/main" w="9525">
                 <a:solidFill>
                   <a:srgbClr val="000000"/>
                 </a:solidFill>
@@ -5858,7 +5866,7 @@
           <a:p>
             <a:fld id="{7C67DB7F-CC58-48E2-BE0E-8BA189DDF264}" type="datetimeFigureOut">
               <a:rPr lang="ko-KR" altLang="en-US" smtClean="0"/>
-              <a:t>2017-10-29</a:t>
+              <a:t>2017-11-14</a:t>
             </a:fld>
             <a:endParaRPr lang="ko-KR" altLang="en-US"/>
           </a:p>
@@ -6013,7 +6021,7 @@
           <a:ln/>
           <a:extLst>
             <a:ext uri="{91240B29-F687-4f45-9708-019B960494DF}">
-              <a14:hiddenLine xmlns:a14="http://schemas.microsoft.com/office/drawing/2010/main" xmlns="" w="9525">
+              <a14:hiddenLine xmlns="" xmlns:a14="http://schemas.microsoft.com/office/drawing/2010/main" w="9525">
                 <a:solidFill>
                   <a:srgbClr val="000000"/>
                 </a:solidFill>
@@ -6335,7 +6343,7 @@
           <a:p>
             <a:fld id="{7C67DB7F-CC58-48E2-BE0E-8BA189DDF264}" type="datetimeFigureOut">
               <a:rPr lang="ko-KR" altLang="en-US" smtClean="0"/>
-              <a:t>2017-10-29</a:t>
+              <a:t>2017-11-14</a:t>
             </a:fld>
             <a:endParaRPr lang="ko-KR" altLang="en-US"/>
           </a:p>
@@ -6490,7 +6498,7 @@
           <a:ln/>
           <a:extLst>
             <a:ext uri="{91240B29-F687-4f45-9708-019B960494DF}">
-              <a14:hiddenLine xmlns:a14="http://schemas.microsoft.com/office/drawing/2010/main" xmlns="" w="9525">
+              <a14:hiddenLine xmlns="" xmlns:a14="http://schemas.microsoft.com/office/drawing/2010/main" w="9525">
                 <a:solidFill>
                   <a:srgbClr val="000000"/>
                 </a:solidFill>
@@ -6556,7 +6564,7 @@
           <a:p>
             <a:fld id="{7C67DB7F-CC58-48E2-BE0E-8BA189DDF264}" type="datetimeFigureOut">
               <a:rPr lang="ko-KR" altLang="en-US" smtClean="0"/>
-              <a:t>2017-10-29</a:t>
+              <a:t>2017-11-14</a:t>
             </a:fld>
             <a:endParaRPr lang="ko-KR" altLang="en-US"/>
           </a:p>
@@ -6651,7 +6659,7 @@
           <a:p>
             <a:fld id="{7C67DB7F-CC58-48E2-BE0E-8BA189DDF264}" type="datetimeFigureOut">
               <a:rPr lang="ko-KR" altLang="en-US" smtClean="0"/>
-              <a:t>2017-10-29</a:t>
+              <a:t>2017-11-14</a:t>
             </a:fld>
             <a:endParaRPr lang="ko-KR" altLang="en-US"/>
           </a:p>
@@ -6919,7 +6927,7 @@
           <a:ln/>
           <a:extLst>
             <a:ext uri="{91240B29-F687-4f45-9708-019B960494DF}">
-              <a14:hiddenLine xmlns:a14="http://schemas.microsoft.com/office/drawing/2010/main" xmlns="" w="9525">
+              <a14:hiddenLine xmlns="" xmlns:a14="http://schemas.microsoft.com/office/drawing/2010/main" w="9525">
                 <a:solidFill>
                   <a:srgbClr val="000000"/>
                 </a:solidFill>
@@ -7118,7 +7126,7 @@
           <a:p>
             <a:fld id="{7C67DB7F-CC58-48E2-BE0E-8BA189DDF264}" type="datetimeFigureOut">
               <a:rPr lang="ko-KR" altLang="en-US" smtClean="0"/>
-              <a:t>2017-10-29</a:t>
+              <a:t>2017-11-14</a:t>
             </a:fld>
             <a:endParaRPr lang="ko-KR" altLang="en-US"/>
           </a:p>
@@ -7431,7 +7439,7 @@
           <a:p>
             <a:fld id="{7C67DB7F-CC58-48E2-BE0E-8BA189DDF264}" type="datetimeFigureOut">
               <a:rPr lang="ko-KR" altLang="en-US" smtClean="0"/>
-              <a:t>2017-10-29</a:t>
+              <a:t>2017-11-14</a:t>
             </a:fld>
             <a:endParaRPr lang="ko-KR" altLang="en-US"/>
           </a:p>
@@ -7701,7 +7709,7 @@
           <a:p>
             <a:fld id="{7C67DB7F-CC58-48E2-BE0E-8BA189DDF264}" type="datetimeFigureOut">
               <a:rPr lang="ko-KR" altLang="en-US" smtClean="0"/>
-              <a:t>2017-10-29</a:t>
+              <a:t>2017-11-14</a:t>
             </a:fld>
             <a:endParaRPr lang="ko-KR" altLang="en-US"/>
           </a:p>
@@ -8173,12 +8181,9 @@
           <a:p>
             <a:r>
               <a:rPr lang="en-US" altLang="ko-KR" dirty="0"/>
-              <a:t>SW </a:t>
-            </a:r>
-            <a:r>
-              <a:rPr lang="ko-KR" altLang="en-US" dirty="0"/>
-              <a:t>프로그래밍</a:t>
-            </a:r>
+              <a:t>SW Programming</a:t>
+            </a:r>
+            <a:endParaRPr lang="ko-KR" altLang="en-US" dirty="0"/>
           </a:p>
         </p:txBody>
       </p:sp>
@@ -8228,6 +8233,152 @@
 </file>
 
 <file path=ppt/slides/slide10.xml><?xml version="1.0" encoding="utf-8"?>
+<p:sld xmlns:a="http://schemas.openxmlformats.org/drawingml/2006/main" xmlns:r="http://schemas.openxmlformats.org/officeDocument/2006/relationships" xmlns:p="http://schemas.openxmlformats.org/presentationml/2006/main">
+  <p:cSld>
+    <p:spTree>
+      <p:nvGrpSpPr>
+        <p:cNvPr id="1" name=""/>
+        <p:cNvGrpSpPr/>
+        <p:nvPr/>
+      </p:nvGrpSpPr>
+      <p:grpSpPr>
+        <a:xfrm>
+          <a:off x="0" y="0"/>
+          <a:ext cx="0" cy="0"/>
+          <a:chOff x="0" y="0"/>
+          <a:chExt cx="0" cy="0"/>
+        </a:xfrm>
+      </p:grpSpPr>
+      <p:sp>
+        <p:nvSpPr>
+          <p:cNvPr id="2" name="제목 1">
+            <a:extLst>
+              <a:ext uri="{FF2B5EF4-FFF2-40B4-BE49-F238E27FC236}">
+                <a16:creationId xmlns:a16="http://schemas.microsoft.com/office/drawing/2014/main" id="{F0FDDCD6-A14C-4889-95C7-3B155DF6D798}"/>
+              </a:ext>
+            </a:extLst>
+          </p:cNvPr>
+          <p:cNvSpPr>
+            <a:spLocks noGrp="1"/>
+          </p:cNvSpPr>
+          <p:nvPr>
+            <p:ph type="title"/>
+          </p:nvPr>
+        </p:nvSpPr>
+        <p:spPr/>
+        <p:txBody>
+          <a:bodyPr/>
+          <a:lstStyle/>
+          <a:p>
+            <a:r>
+              <a:rPr lang="en-US" altLang="ko-KR" dirty="0"/>
+              <a:t>Is it really possible? (Scale Issue)</a:t>
+            </a:r>
+            <a:endParaRPr lang="ko-KR" altLang="en-US" dirty="0"/>
+          </a:p>
+        </p:txBody>
+      </p:sp>
+      <p:pic>
+        <p:nvPicPr>
+          <p:cNvPr id="5" name="그림 4">
+            <a:extLst>
+              <a:ext uri="{FF2B5EF4-FFF2-40B4-BE49-F238E27FC236}">
+                <a16:creationId xmlns:a16="http://schemas.microsoft.com/office/drawing/2014/main" id="{8B62223C-5A96-40B2-BA37-81193B6DA458}"/>
+              </a:ext>
+            </a:extLst>
+          </p:cNvPr>
+          <p:cNvPicPr>
+            <a:picLocks noChangeAspect="1"/>
+          </p:cNvPicPr>
+          <p:nvPr/>
+        </p:nvPicPr>
+        <p:blipFill>
+          <a:blip r:embed="rId2"/>
+          <a:stretch>
+            <a:fillRect/>
+          </a:stretch>
+        </p:blipFill>
+        <p:spPr>
+          <a:xfrm>
+            <a:off x="4101786" y="3335494"/>
+            <a:ext cx="6319155" cy="3404671"/>
+          </a:xfrm>
+          <a:prstGeom prst="rect">
+            <a:avLst/>
+          </a:prstGeom>
+        </p:spPr>
+      </p:pic>
+      <p:sp>
+        <p:nvSpPr>
+          <p:cNvPr id="7" name="내용 개체 틀 6">
+            <a:extLst>
+              <a:ext uri="{FF2B5EF4-FFF2-40B4-BE49-F238E27FC236}">
+                <a16:creationId xmlns:a16="http://schemas.microsoft.com/office/drawing/2014/main" id="{44EF9BD7-007A-4140-B8EF-635A84C90C69}"/>
+              </a:ext>
+            </a:extLst>
+          </p:cNvPr>
+          <p:cNvSpPr>
+            <a:spLocks noGrp="1"/>
+          </p:cNvSpPr>
+          <p:nvPr>
+            <p:ph idx="1"/>
+          </p:nvPr>
+        </p:nvSpPr>
+        <p:spPr>
+          <a:xfrm>
+            <a:off x="810000" y="1228009"/>
+            <a:ext cx="6583575" cy="3636511"/>
+          </a:xfrm>
+        </p:spPr>
+        <p:txBody>
+          <a:bodyPr/>
+          <a:lstStyle/>
+          <a:p>
+            <a:r>
+              <a:rPr lang="en-US" altLang="ko-KR" dirty="0"/>
+              <a:t>Toy Test</a:t>
+            </a:r>
+          </a:p>
+          <a:p>
+            <a:r>
+              <a:rPr lang="en-US" altLang="ko-KR" dirty="0"/>
+              <a:t>The length of time it takes to simply find?</a:t>
+            </a:r>
+          </a:p>
+          <a:p>
+            <a:r>
+              <a:rPr lang="en-US" altLang="ko-KR" dirty="0"/>
+              <a:t>(The decimal precision is up to the fifth decimal place.)</a:t>
+            </a:r>
+          </a:p>
+          <a:p>
+            <a:r>
+              <a:rPr lang="en-US" altLang="ko-KR" dirty="0"/>
+              <a:t>0.00405 (in Debug)</a:t>
+            </a:r>
+          </a:p>
+          <a:p>
+            <a:r>
+              <a:rPr lang="en-US" altLang="ko-KR" dirty="0"/>
+              <a:t>0.00101 (in Release)</a:t>
+            </a:r>
+          </a:p>
+        </p:txBody>
+      </p:sp>
+    </p:spTree>
+    <p:extLst>
+      <p:ext uri="{BB962C8B-B14F-4D97-AF65-F5344CB8AC3E}">
+        <p14:creationId xmlns:p14="http://schemas.microsoft.com/office/powerpoint/2010/main" val="2095903882"/>
+      </p:ext>
+    </p:extLst>
+  </p:cSld>
+  <p:clrMapOvr>
+    <a:masterClrMapping/>
+  </p:clrMapOvr>
+</p:sld>
+</file>
+
+<file path=ppt/slides/slide11.xml><?xml version="1.0" encoding="utf-8"?>
 <p:sld xmlns:a="http://schemas.openxmlformats.org/drawingml/2006/main" xmlns:r="http://schemas.openxmlformats.org/officeDocument/2006/relationships" xmlns:p="http://schemas.openxmlformats.org/presentationml/2006/main">
   <p:cSld>
     <p:spTree>
@@ -8671,7 +8822,7 @@
 </p:sld>
 </file>
 
-<file path=ppt/slides/slide11.xml><?xml version="1.0" encoding="utf-8"?>
+<file path=ppt/slides/slide12.xml><?xml version="1.0" encoding="utf-8"?>
 <p:sld xmlns:a="http://schemas.openxmlformats.org/drawingml/2006/main" xmlns:r="http://schemas.openxmlformats.org/officeDocument/2006/relationships" xmlns:p="http://schemas.openxmlformats.org/presentationml/2006/main">
   <p:cSld>
     <p:spTree>
@@ -8894,7 +9045,7 @@
 </p:sld>
 </file>
 
-<file path=ppt/slides/slide2.xml><?xml version="1.0" encoding="utf-8"?>
+<file path=ppt/slides/slide13.xml><?xml version="1.0" encoding="utf-8"?>
 <p:sld xmlns:a="http://schemas.openxmlformats.org/drawingml/2006/main" xmlns:r="http://schemas.openxmlformats.org/officeDocument/2006/relationships" xmlns:p="http://schemas.openxmlformats.org/presentationml/2006/main">
   <p:cSld>
     <p:spTree>
@@ -8913,10 +9064,10 @@
       </p:grpSpPr>
       <p:sp>
         <p:nvSpPr>
-          <p:cNvPr id="2" name="제목 1">
+          <p:cNvPr id="6" name="제목 5">
             <a:extLst>
               <a:ext uri="{FF2B5EF4-FFF2-40B4-BE49-F238E27FC236}">
-                <a16:creationId xmlns:a16="http://schemas.microsoft.com/office/drawing/2014/main" id="{DE30E5D8-13A2-43D9-B9BD-60DA24B9F1D8}"/>
+                <a16:creationId xmlns:a16="http://schemas.microsoft.com/office/drawing/2014/main" id="{78EB70CB-B516-45EB-A901-8E45E2CBEC12}"/>
               </a:ext>
             </a:extLst>
           </p:cNvPr>
@@ -8934,7 +9085,7 @@
           <a:p>
             <a:r>
               <a:rPr lang="en-US" altLang="ko-KR" dirty="0"/>
-              <a:t>Focus</a:t>
+              <a:t>Algorithm &amp; Solution</a:t>
             </a:r>
             <a:endParaRPr lang="ko-KR" altLang="en-US" dirty="0"/>
           </a:p>
@@ -8942,10 +9093,10 @@
       </p:sp>
       <p:sp>
         <p:nvSpPr>
-          <p:cNvPr id="3" name="내용 개체 틀 2">
+          <p:cNvPr id="7" name="텍스트 개체 틀 6">
             <a:extLst>
               <a:ext uri="{FF2B5EF4-FFF2-40B4-BE49-F238E27FC236}">
-                <a16:creationId xmlns:a16="http://schemas.microsoft.com/office/drawing/2014/main" id="{7C3ACE1D-47A2-49BB-8605-358B4E41CCF1}"/>
+                <a16:creationId xmlns:a16="http://schemas.microsoft.com/office/drawing/2014/main" id="{F76BFEF9-E073-49EF-9469-0D0BF853DB1C}"/>
               </a:ext>
             </a:extLst>
           </p:cNvPr>
@@ -8953,33 +9104,34 @@
             <a:spLocks noGrp="1"/>
           </p:cNvSpPr>
           <p:nvPr>
-            <p:ph idx="1"/>
+            <p:ph type="body" idx="1"/>
           </p:nvPr>
         </p:nvSpPr>
         <p:spPr/>
         <p:txBody>
-          <a:bodyPr>
-            <a:normAutofit/>
-          </a:bodyPr>
+          <a:bodyPr/>
           <a:lstStyle/>
           <a:p>
             <a:r>
-              <a:rPr lang="en-US" altLang="ko-KR" sz="2800" dirty="0"/>
-              <a:t>The Degree of Accuracy</a:t>
-            </a:r>
-          </a:p>
-          <a:p>
-            <a:r>
-              <a:rPr lang="en-US" altLang="ko-KR" sz="2800" dirty="0"/>
-              <a:t>Scale Issue (Memory &amp; Speed)</a:t>
-            </a:r>
+              <a:rPr lang="en-US" altLang="ko-KR" dirty="0"/>
+              <a:t>Nov 17 – 2</a:t>
+            </a:r>
+            <a:r>
+              <a:rPr lang="en-US" altLang="ko-KR" baseline="30000" dirty="0"/>
+              <a:t>nd</a:t>
+            </a:r>
+            <a:r>
+              <a:rPr lang="en-US" altLang="ko-KR" dirty="0"/>
+              <a:t> Presentation</a:t>
+            </a:r>
+            <a:endParaRPr lang="ko-KR" altLang="en-US" dirty="0"/>
           </a:p>
         </p:txBody>
       </p:sp>
     </p:spTree>
     <p:extLst>
       <p:ext uri="{BB962C8B-B14F-4D97-AF65-F5344CB8AC3E}">
-        <p14:creationId xmlns:p14="http://schemas.microsoft.com/office/powerpoint/2010/main" val="1145740769"/>
+        <p14:creationId xmlns:p14="http://schemas.microsoft.com/office/powerpoint/2010/main" val="1408676980"/>
       </p:ext>
     </p:extLst>
   </p:cSld>
@@ -8989,7 +9141,7 @@
 </p:sld>
 </file>
 
-<file path=ppt/slides/slide3.xml><?xml version="1.0" encoding="utf-8"?>
+<file path=ppt/slides/slide14.xml><?xml version="1.0" encoding="utf-8"?>
 <p:sld xmlns:a="http://schemas.openxmlformats.org/drawingml/2006/main" xmlns:r="http://schemas.openxmlformats.org/officeDocument/2006/relationships" xmlns:p="http://schemas.openxmlformats.org/presentationml/2006/main">
   <p:cSld>
     <p:spTree>
@@ -9011,7 +9163,7 @@
           <p:cNvPr id="2" name="제목 1">
             <a:extLst>
               <a:ext uri="{FF2B5EF4-FFF2-40B4-BE49-F238E27FC236}">
-                <a16:creationId xmlns:a16="http://schemas.microsoft.com/office/drawing/2014/main" id="{0C689FF7-1300-4F3D-B5DA-76F499846E79}"/>
+                <a16:creationId xmlns:a16="http://schemas.microsoft.com/office/drawing/2014/main" id="{E8DEDA94-B334-4F17-A2B0-C690D35E5FF3}"/>
               </a:ext>
             </a:extLst>
           </p:cNvPr>
@@ -9027,45 +9179,51 @@
           <a:bodyPr/>
           <a:lstStyle/>
           <a:p>
+            <a:r>
+              <a:rPr lang="en-US" altLang="ko-KR" dirty="0"/>
+              <a:t>Algorithm?</a:t>
+            </a:r>
             <a:endParaRPr lang="ko-KR" altLang="en-US" dirty="0"/>
           </a:p>
         </p:txBody>
       </p:sp>
-      <p:graphicFrame>
-        <p:nvGraphicFramePr>
-          <p:cNvPr id="4" name="내용 개체 틀 3">
+      <p:sp>
+        <p:nvSpPr>
+          <p:cNvPr id="3" name="내용 개체 틀 2">
             <a:extLst>
               <a:ext uri="{FF2B5EF4-FFF2-40B4-BE49-F238E27FC236}">
-                <a16:creationId xmlns:a16="http://schemas.microsoft.com/office/drawing/2014/main" id="{995BB9E7-B6AA-4BA0-9859-B12982EA93BF}"/>
+                <a16:creationId xmlns:a16="http://schemas.microsoft.com/office/drawing/2014/main" id="{B2B5305F-19AC-4D4B-9E05-0194CC0D6ABD}"/>
               </a:ext>
             </a:extLst>
           </p:cNvPr>
-          <p:cNvGraphicFramePr>
-            <a:graphicFrameLocks noGrp="1"/>
-          </p:cNvGraphicFramePr>
+          <p:cNvSpPr>
+            <a:spLocks noGrp="1"/>
+          </p:cNvSpPr>
           <p:nvPr>
             <p:ph idx="1"/>
-            <p:extLst>
-              <p:ext uri="{D42A27DB-BD31-4B8C-83A1-F6EECF244321}">
-                <p14:modId xmlns:p14="http://schemas.microsoft.com/office/powerpoint/2010/main" val="3948990566"/>
-              </p:ext>
-            </p:extLst>
           </p:nvPr>
-        </p:nvGraphicFramePr>
-        <p:xfrm>
-          <a:off x="819150" y="2222500"/>
-          <a:ext cx="10553700" cy="3636963"/>
-        </p:xfrm>
-        <a:graphic>
-          <a:graphicData uri="http://schemas.openxmlformats.org/drawingml/2006/diagram">
-            <dgm:relIds xmlns:dgm="http://schemas.openxmlformats.org/drawingml/2006/diagram" xmlns:r="http://schemas.openxmlformats.org/officeDocument/2006/relationships" r:dm="rId2" r:lo="rId3" r:qs="rId4" r:cs="rId5"/>
-          </a:graphicData>
-        </a:graphic>
-      </p:graphicFrame>
+        </p:nvSpPr>
+        <p:spPr>
+          <a:xfrm>
+            <a:off x="818711" y="2222287"/>
+            <a:ext cx="10955367" cy="3895709"/>
+          </a:xfrm>
+        </p:spPr>
+        <p:txBody>
+          <a:bodyPr/>
+          <a:lstStyle/>
+          <a:p>
+            <a:r>
+              <a:rPr lang="en-US" altLang="ko-KR" dirty="0"/>
+              <a:t>Because my Algorithm use keyword position in sentence, I want to extract sentence!! \@^@/</a:t>
+            </a:r>
+          </a:p>
+        </p:txBody>
+      </p:sp>
     </p:spTree>
     <p:extLst>
       <p:ext uri="{BB962C8B-B14F-4D97-AF65-F5344CB8AC3E}">
-        <p14:creationId xmlns:p14="http://schemas.microsoft.com/office/powerpoint/2010/main" val="887975944"/>
+        <p14:creationId xmlns:p14="http://schemas.microsoft.com/office/powerpoint/2010/main" val="3119572147"/>
       </p:ext>
     </p:extLst>
   </p:cSld>
@@ -9075,7 +9233,7 @@
 </p:sld>
 </file>
 
-<file path=ppt/slides/slide4.xml><?xml version="1.0" encoding="utf-8"?>
+<file path=ppt/slides/slide15.xml><?xml version="1.0" encoding="utf-8"?>
 <p:sld xmlns:a="http://schemas.openxmlformats.org/drawingml/2006/main" xmlns:r="http://schemas.openxmlformats.org/officeDocument/2006/relationships" xmlns:p="http://schemas.openxmlformats.org/presentationml/2006/main">
   <p:cSld>
     <p:spTree>
@@ -9094,10 +9252,10 @@
       </p:grpSpPr>
       <p:sp>
         <p:nvSpPr>
-          <p:cNvPr id="2" name="제목 1">
+          <p:cNvPr id="4" name="제목 3">
             <a:extLst>
               <a:ext uri="{FF2B5EF4-FFF2-40B4-BE49-F238E27FC236}">
-                <a16:creationId xmlns:a16="http://schemas.microsoft.com/office/drawing/2014/main" id="{C3D80261-8AFC-417B-BB1B-D463939599F1}"/>
+                <a16:creationId xmlns:a16="http://schemas.microsoft.com/office/drawing/2014/main" id="{F9EF1FBA-6C27-4B1C-9094-A5D8CB39FC73}"/>
               </a:ext>
             </a:extLst>
           </p:cNvPr>
@@ -9114,8 +9272,8 @@
           <a:lstStyle/>
           <a:p>
             <a:r>
-              <a:rPr lang="en-US" altLang="ko-KR" dirty="0"/>
-              <a:t>Flow Chart</a:t>
+              <a:rPr lang="en-US" altLang="ko-KR" dirty="0" err="1"/>
+              <a:t>extractSentence</a:t>
             </a:r>
             <a:endParaRPr lang="ko-KR" altLang="en-US" dirty="0"/>
           </a:p>
@@ -9123,10 +9281,10 @@
       </p:sp>
       <p:sp>
         <p:nvSpPr>
-          <p:cNvPr id="3" name="내용 개체 틀 2">
+          <p:cNvPr id="5" name="내용 개체 틀 4">
             <a:extLst>
               <a:ext uri="{FF2B5EF4-FFF2-40B4-BE49-F238E27FC236}">
-                <a16:creationId xmlns:a16="http://schemas.microsoft.com/office/drawing/2014/main" id="{88B0F32B-23CB-41AB-88F1-3DDCF32CDA59}"/>
+                <a16:creationId xmlns:a16="http://schemas.microsoft.com/office/drawing/2014/main" id="{90B93D23-AC31-4CEF-AD79-7395773A368A}"/>
               </a:ext>
             </a:extLst>
           </p:cNvPr>
@@ -9142,16 +9300,16 @@
           <a:bodyPr/>
           <a:lstStyle/>
           <a:p>
-            <a:endParaRPr lang="ko-KR" altLang="en-US" dirty="0"/>
+            <a:endParaRPr lang="ko-KR" altLang="en-US"/>
           </a:p>
         </p:txBody>
       </p:sp>
       <p:pic>
         <p:nvPicPr>
-          <p:cNvPr id="4" name="그림 3">
+          <p:cNvPr id="6" name="그림 5">
             <a:extLst>
               <a:ext uri="{FF2B5EF4-FFF2-40B4-BE49-F238E27FC236}">
-                <a16:creationId xmlns:a16="http://schemas.microsoft.com/office/drawing/2014/main" id="{43AF3812-CB4B-44CC-A900-CC7D4A2D722F}"/>
+                <a16:creationId xmlns:a16="http://schemas.microsoft.com/office/drawing/2014/main" id="{D5545AFE-8737-42D8-92EB-2580AEAEA17F}"/>
               </a:ext>
             </a:extLst>
           </p:cNvPr>
@@ -9168,8 +9326,8 @@
         </p:blipFill>
         <p:spPr>
           <a:xfrm>
-            <a:off x="4537630" y="0"/>
-            <a:ext cx="4653504" cy="6767856"/>
+            <a:off x="0" y="1688717"/>
+            <a:ext cx="12192000" cy="5169283"/>
           </a:xfrm>
           <a:prstGeom prst="rect">
             <a:avLst/>
@@ -9179,7 +9337,7 @@
     </p:spTree>
     <p:extLst>
       <p:ext uri="{BB962C8B-B14F-4D97-AF65-F5344CB8AC3E}">
-        <p14:creationId xmlns:p14="http://schemas.microsoft.com/office/powerpoint/2010/main" val="2216799287"/>
+        <p14:creationId xmlns:p14="http://schemas.microsoft.com/office/powerpoint/2010/main" val="2868807402"/>
       </p:ext>
     </p:extLst>
   </p:cSld>
@@ -9189,7 +9347,7 @@
 </p:sld>
 </file>
 
-<file path=ppt/slides/slide5.xml><?xml version="1.0" encoding="utf-8"?>
+<file path=ppt/slides/slide16.xml><?xml version="1.0" encoding="utf-8"?>
 <p:sld xmlns:a="http://schemas.openxmlformats.org/drawingml/2006/main" xmlns:r="http://schemas.openxmlformats.org/officeDocument/2006/relationships" xmlns:p="http://schemas.openxmlformats.org/presentationml/2006/main">
   <p:cSld>
     <p:spTree>
@@ -9211,7 +9369,7 @@
           <p:cNvPr id="2" name="제목 1">
             <a:extLst>
               <a:ext uri="{FF2B5EF4-FFF2-40B4-BE49-F238E27FC236}">
-                <a16:creationId xmlns:a16="http://schemas.microsoft.com/office/drawing/2014/main" id="{2C01AB32-7341-4434-AF17-746D4E5193A1}"/>
+                <a16:creationId xmlns:a16="http://schemas.microsoft.com/office/drawing/2014/main" id="{7CFA0BD8-FB9F-40D4-BB1A-241E1EC96E3D}"/>
               </a:ext>
             </a:extLst>
           </p:cNvPr>
@@ -9228,8 +9386,8 @@
           <a:lstStyle/>
           <a:p>
             <a:r>
-              <a:rPr lang="en-US" altLang="ko-KR" dirty="0"/>
-              <a:t>Get File List</a:t>
+              <a:rPr lang="en-US" altLang="ko-KR" dirty="0" err="1"/>
+              <a:t>extractSentence</a:t>
             </a:r>
             <a:endParaRPr lang="ko-KR" altLang="en-US" dirty="0"/>
           </a:p>
@@ -9240,7 +9398,7 @@
           <p:cNvPr id="3" name="내용 개체 틀 2">
             <a:extLst>
               <a:ext uri="{FF2B5EF4-FFF2-40B4-BE49-F238E27FC236}">
-                <a16:creationId xmlns:a16="http://schemas.microsoft.com/office/drawing/2014/main" id="{A76D372C-7A8B-4709-9D34-329D950A0106}"/>
+                <a16:creationId xmlns:a16="http://schemas.microsoft.com/office/drawing/2014/main" id="{DA4B38EC-E323-49DA-90CD-DD7DA76B5ACA}"/>
               </a:ext>
             </a:extLst>
           </p:cNvPr>
@@ -9257,99 +9415,8 @@
           <a:lstStyle/>
           <a:p>
             <a:r>
-              <a:rPr lang="en-US" altLang="ko-KR" dirty="0" err="1"/>
-              <a:t>io.h</a:t>
-            </a:r>
-            <a:endParaRPr lang="en-US" altLang="ko-KR" dirty="0"/>
-          </a:p>
-          <a:p>
-            <a:r>
               <a:rPr lang="en-US" altLang="ko-KR" dirty="0"/>
-              <a:t>long _</a:t>
-            </a:r>
-            <a:r>
-              <a:rPr lang="en-US" altLang="ko-KR" dirty="0" err="1"/>
-              <a:t>findfirst</a:t>
-            </a:r>
-            <a:r>
-              <a:rPr lang="en-US" altLang="ko-KR" dirty="0"/>
-              <a:t>(char *</a:t>
-            </a:r>
-            <a:r>
-              <a:rPr lang="en-US" altLang="ko-KR" dirty="0" err="1"/>
-              <a:t>filespec</a:t>
-            </a:r>
-            <a:r>
-              <a:rPr lang="en-US" altLang="ko-KR" dirty="0"/>
-              <a:t>, struct _</a:t>
-            </a:r>
-            <a:r>
-              <a:rPr lang="en-US" altLang="ko-KR" dirty="0" err="1"/>
-              <a:t>findata_at</a:t>
-            </a:r>
-            <a:r>
-              <a:rPr lang="en-US" altLang="ko-KR" dirty="0"/>
-              <a:t> *</a:t>
-            </a:r>
-            <a:r>
-              <a:rPr lang="en-US" altLang="ko-KR" dirty="0" err="1"/>
-              <a:t>fileinfo</a:t>
-            </a:r>
-            <a:r>
-              <a:rPr lang="en-US" altLang="ko-KR" dirty="0"/>
-              <a:t>);</a:t>
-            </a:r>
-          </a:p>
-          <a:p>
-            <a:r>
-              <a:rPr lang="en-US" altLang="ko-KR" dirty="0" err="1"/>
-              <a:t>int</a:t>
-            </a:r>
-            <a:r>
-              <a:rPr lang="en-US" altLang="ko-KR" dirty="0"/>
-              <a:t> _</a:t>
-            </a:r>
-            <a:r>
-              <a:rPr lang="en-US" altLang="ko-KR" dirty="0" err="1"/>
-              <a:t>findnect</a:t>
-            </a:r>
-            <a:r>
-              <a:rPr lang="en-US" altLang="ko-KR" dirty="0"/>
-              <a:t>(long handle, struct _</a:t>
-            </a:r>
-            <a:r>
-              <a:rPr lang="en-US" altLang="ko-KR" dirty="0" err="1"/>
-              <a:t>finddata_t</a:t>
-            </a:r>
-            <a:r>
-              <a:rPr lang="en-US" altLang="ko-KR" dirty="0"/>
-              <a:t> *</a:t>
-            </a:r>
-            <a:r>
-              <a:rPr lang="en-US" altLang="ko-KR" dirty="0" err="1"/>
-              <a:t>fileinfo</a:t>
-            </a:r>
-            <a:r>
-              <a:rPr lang="en-US" altLang="ko-KR" dirty="0"/>
-              <a:t>);</a:t>
-            </a:r>
-          </a:p>
-          <a:p>
-            <a:r>
-              <a:rPr lang="en-US" altLang="ko-KR" dirty="0" err="1"/>
-              <a:t>int</a:t>
-            </a:r>
-            <a:r>
-              <a:rPr lang="en-US" altLang="ko-KR" dirty="0"/>
-              <a:t> _</a:t>
-            </a:r>
-            <a:r>
-              <a:rPr lang="en-US" altLang="ko-KR" dirty="0" err="1"/>
-              <a:t>findclose</a:t>
-            </a:r>
-            <a:r>
-              <a:rPr lang="en-US" altLang="ko-KR" dirty="0"/>
-              <a:t>(long handle);</a:t>
+              <a:t>Sentence Point</a:t>
             </a:r>
             <a:endParaRPr lang="ko-KR" altLang="en-US" dirty="0"/>
           </a:p>
@@ -9358,7 +9425,7 @@
     </p:spTree>
     <p:extLst>
       <p:ext uri="{BB962C8B-B14F-4D97-AF65-F5344CB8AC3E}">
-        <p14:creationId xmlns:p14="http://schemas.microsoft.com/office/powerpoint/2010/main" val="3604949291"/>
+        <p14:creationId xmlns:p14="http://schemas.microsoft.com/office/powerpoint/2010/main" val="1419764713"/>
       </p:ext>
     </p:extLst>
   </p:cSld>
@@ -9368,7 +9435,7 @@
 </p:sld>
 </file>
 
-<file path=ppt/slides/slide6.xml><?xml version="1.0" encoding="utf-8"?>
+<file path=ppt/slides/slide17.xml><?xml version="1.0" encoding="utf-8"?>
 <p:sld xmlns:a="http://schemas.openxmlformats.org/drawingml/2006/main" xmlns:r="http://schemas.openxmlformats.org/officeDocument/2006/relationships" xmlns:p="http://schemas.openxmlformats.org/presentationml/2006/main">
   <p:cSld>
     <p:spTree>
@@ -9385,12 +9452,42 @@
           <a:chExt cx="0" cy="0"/>
         </a:xfrm>
       </p:grpSpPr>
-      <p:sp>
-        <p:nvSpPr>
-          <p:cNvPr id="2" name="제목 1">
+      <p:pic>
+        <p:nvPicPr>
+          <p:cNvPr id="6" name="그림 5">
             <a:extLst>
               <a:ext uri="{FF2B5EF4-FFF2-40B4-BE49-F238E27FC236}">
-                <a16:creationId xmlns:a16="http://schemas.microsoft.com/office/drawing/2014/main" id="{4B158C55-8274-4877-AC52-1CA96A1F081C}"/>
+                <a16:creationId xmlns:a16="http://schemas.microsoft.com/office/drawing/2014/main" id="{A52EFBBD-E158-442A-9927-28E7F3C90F5A}"/>
+              </a:ext>
+            </a:extLst>
+          </p:cNvPr>
+          <p:cNvPicPr>
+            <a:picLocks noChangeAspect="1"/>
+          </p:cNvPicPr>
+          <p:nvPr/>
+        </p:nvPicPr>
+        <p:blipFill>
+          <a:blip r:embed="rId2"/>
+          <a:stretch>
+            <a:fillRect/>
+          </a:stretch>
+        </p:blipFill>
+        <p:spPr>
+          <a:xfrm>
+            <a:off x="4487159" y="2329226"/>
+            <a:ext cx="7448452" cy="4081586"/>
+          </a:xfrm>
+          <a:prstGeom prst="rect">
+            <a:avLst/>
+          </a:prstGeom>
+        </p:spPr>
+      </p:pic>
+      <p:sp>
+        <p:nvSpPr>
+          <p:cNvPr id="4" name="제목 3">
+            <a:extLst>
+              <a:ext uri="{FF2B5EF4-FFF2-40B4-BE49-F238E27FC236}">
+                <a16:creationId xmlns:a16="http://schemas.microsoft.com/office/drawing/2014/main" id="{516EEAAF-B35C-4C0E-8B39-D046DBCAFD49}"/>
               </a:ext>
             </a:extLst>
           </p:cNvPr>
@@ -9407,231 +9504,79 @@
           <a:lstStyle/>
           <a:p>
             <a:r>
+              <a:rPr lang="en-US" altLang="ko-KR" dirty="0" err="1"/>
+              <a:t>extractSentece</a:t>
+            </a:r>
+            <a:r>
               <a:rPr lang="en-US" altLang="ko-KR" dirty="0"/>
-              <a:t>Pattern Search</a:t>
+              <a:t> test</a:t>
             </a:r>
             <a:endParaRPr lang="ko-KR" altLang="en-US" dirty="0"/>
           </a:p>
         </p:txBody>
       </p:sp>
-      <mc:AlternateContent xmlns:mc="http://schemas.openxmlformats.org/markup-compatibility/2006" xmlns:a14="http://schemas.microsoft.com/office/drawing/2010/main">
-        <mc:Choice Requires="a14">
-          <p:sp>
-            <p:nvSpPr>
-              <p:cNvPr id="3" name="내용 개체 틀 2">
-                <a:extLst>
-                  <a:ext uri="{FF2B5EF4-FFF2-40B4-BE49-F238E27FC236}">
-                    <a16:creationId xmlns:a16="http://schemas.microsoft.com/office/drawing/2014/main" id="{ACD1CD8A-EC15-407F-A8E0-DAAF58FAA763}"/>
-                  </a:ext>
-                </a:extLst>
-              </p:cNvPr>
-              <p:cNvSpPr>
-                <a:spLocks noGrp="1"/>
-              </p:cNvSpPr>
-              <p:nvPr>
-                <p:ph idx="1"/>
-              </p:nvPr>
-            </p:nvSpPr>
-            <p:spPr/>
-            <p:txBody>
-              <a:bodyPr/>
-              <a:lstStyle/>
-              <a:p>
-                <a:r>
-                  <a:rPr lang="en-US" altLang="ko-KR" dirty="0"/>
-                  <a:t>s</a:t>
-                </a:r>
-                <a:r>
-                  <a:rPr lang="en-US" altLang="ko-KR" dirty="0" err="1"/>
-                  <a:t>tring.h</a:t>
-                </a:r>
-                <a:r>
-                  <a:rPr lang="en-US" altLang="ko-KR" dirty="0"/>
-                  <a:t> </a:t>
-                </a:r>
-              </a:p>
-              <a:p>
-                <a:r>
-                  <a:rPr lang="en-US" altLang="ko-KR" dirty="0" err="1"/>
-                  <a:t>const</a:t>
-                </a:r>
-                <a:r>
-                  <a:rPr lang="en-US" altLang="ko-KR" dirty="0"/>
-                  <a:t> char * </a:t>
-                </a:r>
-                <a:r>
-                  <a:rPr lang="en-US" altLang="ko-KR" dirty="0" err="1"/>
-                  <a:t>strstr</a:t>
-                </a:r>
-                <a:r>
-                  <a:rPr lang="en-US" altLang="ko-KR" dirty="0"/>
-                  <a:t> ( </a:t>
-                </a:r>
-                <a:r>
-                  <a:rPr lang="en-US" altLang="ko-KR" dirty="0" err="1"/>
-                  <a:t>const</a:t>
-                </a:r>
-                <a:r>
-                  <a:rPr lang="en-US" altLang="ko-KR" dirty="0"/>
-                  <a:t> char * str1, </a:t>
-                </a:r>
-                <a:r>
-                  <a:rPr lang="en-US" altLang="ko-KR" dirty="0" err="1"/>
-                  <a:t>const</a:t>
-                </a:r>
-                <a:r>
-                  <a:rPr lang="en-US" altLang="ko-KR" dirty="0"/>
-                  <a:t> char * str2 );</a:t>
-                </a:r>
-              </a:p>
-              <a:p>
-                <a:r>
-                  <a:rPr lang="en-US" altLang="ko-KR" dirty="0" err="1"/>
-                  <a:t>strstr</a:t>
-                </a:r>
-                <a:r>
-                  <a:rPr lang="ko-KR" altLang="en-US" dirty="0"/>
-                  <a:t> </a:t>
-                </a:r>
-                <a:r>
-                  <a:rPr lang="en-US" altLang="ko-KR" dirty="0"/>
-                  <a:t>function principle</a:t>
-                </a:r>
-                <a:r>
-                  <a:rPr lang="ko-KR" altLang="en-US" dirty="0"/>
-                  <a:t> </a:t>
-                </a:r>
-                <a:r>
-                  <a:rPr lang="en-US" altLang="ko-KR" dirty="0"/>
-                  <a:t>: </a:t>
-                </a:r>
-                <a:r>
-                  <a:rPr lang="en-US" altLang="ko-KR" dirty="0" err="1"/>
-                  <a:t>kmp</a:t>
-                </a:r>
-                <a:r>
-                  <a:rPr lang="en-US" altLang="ko-KR" dirty="0"/>
-                  <a:t> + </a:t>
-                </a:r>
-                <a14:m>
-                  <m:oMath xmlns:m="http://schemas.openxmlformats.org/officeDocument/2006/math">
-                    <m:r>
-                      <m:rPr>
-                        <m:sty m:val="p"/>
-                      </m:rPr>
-                      <a:rPr lang="en-US" altLang="ko-KR" b="0" i="1" smtClean="0">
-                        <a:latin typeface="Cambria Math" panose="02040503050406030204" pitchFamily="18" charset="0"/>
-                      </a:rPr>
-                      <m:t>α</m:t>
-                    </m:r>
-                  </m:oMath>
-                </a14:m>
-                <a:endParaRPr lang="en-US" altLang="ko-KR" dirty="0"/>
-              </a:p>
-              <a:p>
-                <a:r>
-                  <a:rPr lang="en-US" altLang="ko-KR" dirty="0" err="1"/>
-                  <a:t>kmp</a:t>
-                </a:r>
-                <a:r>
-                  <a:rPr lang="en-US" altLang="ko-KR" dirty="0"/>
-                  <a:t> algorithm</a:t>
-                </a:r>
-              </a:p>
-              <a:p>
-                <a:r>
-                  <a:rPr lang="en-US" altLang="ko-KR" dirty="0"/>
-                  <a:t>Save char* data in </a:t>
-                </a:r>
-                <a:r>
-                  <a:rPr lang="en-US" altLang="ko-KR" dirty="0" err="1"/>
-                  <a:t>LinkedList</a:t>
-                </a:r>
-                <a:r>
-                  <a:rPr lang="en-US" altLang="ko-KR" dirty="0"/>
-                  <a:t> (because of convenience of ranking)</a:t>
-                </a:r>
-              </a:p>
-              <a:p>
-                <a:endParaRPr lang="en-US" altLang="ko-KR" dirty="0"/>
-              </a:p>
-            </p:txBody>
-          </p:sp>
-        </mc:Choice>
-        <mc:Fallback xmlns="">
-          <p:sp>
-            <p:nvSpPr>
-              <p:cNvPr id="3" name="내용 개체 틀 2">
-                <a:extLst>
-                  <a:ext uri="{FF2B5EF4-FFF2-40B4-BE49-F238E27FC236}">
-                    <a16:creationId xmlns:a16="http://schemas.microsoft.com/office/drawing/2014/main" id="{ACD1CD8A-EC15-407F-A8E0-DAAF58FAA763}"/>
-                  </a:ext>
-                </a:extLst>
-              </p:cNvPr>
-              <p:cNvSpPr>
-                <a:spLocks noGrp="1" noRot="1" noChangeAspect="1" noMove="1" noResize="1" noEditPoints="1" noAdjustHandles="1" noChangeArrowheads="1" noChangeShapeType="1" noTextEdit="1"/>
-              </p:cNvSpPr>
-              <p:nvPr>
-                <p:ph idx="1"/>
-              </p:nvPr>
-            </p:nvSpPr>
-            <p:spPr>
-              <a:blipFill>
-                <a:blip r:embed="rId2"/>
-                <a:stretch>
-                  <a:fillRect/>
-                </a:stretch>
-              </a:blipFill>
-            </p:spPr>
-            <p:txBody>
-              <a:bodyPr/>
-              <a:lstStyle/>
-              <a:p>
-                <a:r>
-                  <a:rPr lang="ko-KR" altLang="en-US">
-                    <a:noFill/>
-                  </a:rPr>
-                  <a:t> </a:t>
-                </a:r>
-              </a:p>
-            </p:txBody>
-          </p:sp>
-        </mc:Fallback>
-      </mc:AlternateContent>
-      <p:pic>
-        <p:nvPicPr>
-          <p:cNvPr id="5" name="그림 4">
+      <p:sp>
+        <p:nvSpPr>
+          <p:cNvPr id="5" name="내용 개체 틀 4">
             <a:extLst>
               <a:ext uri="{FF2B5EF4-FFF2-40B4-BE49-F238E27FC236}">
-                <a16:creationId xmlns:a16="http://schemas.microsoft.com/office/drawing/2014/main" id="{420CA423-8DC5-44B2-BEDB-F9A5F9F05223}"/>
+                <a16:creationId xmlns:a16="http://schemas.microsoft.com/office/drawing/2014/main" id="{B927F6C2-B4DD-497A-BEDC-56D3FE882D6B}"/>
               </a:ext>
             </a:extLst>
           </p:cNvPr>
-          <p:cNvPicPr>
-            <a:picLocks noChangeAspect="1"/>
-          </p:cNvPicPr>
-          <p:nvPr/>
-        </p:nvPicPr>
-        <p:blipFill>
-          <a:blip r:embed="rId3"/>
-          <a:stretch>
-            <a:fillRect/>
-          </a:stretch>
-        </p:blipFill>
+          <p:cNvSpPr>
+            <a:spLocks noGrp="1"/>
+          </p:cNvSpPr>
+          <p:nvPr>
+            <p:ph idx="1"/>
+          </p:nvPr>
+        </p:nvSpPr>
         <p:spPr>
           <a:xfrm>
-            <a:off x="7887556" y="932413"/>
-            <a:ext cx="3792699" cy="3328287"/>
+            <a:off x="0" y="1892350"/>
+            <a:ext cx="10554574" cy="3636511"/>
           </a:xfrm>
-          <a:prstGeom prst="rect">
-            <a:avLst/>
-          </a:prstGeom>
         </p:spPr>
-      </p:pic>
+        <p:txBody>
+          <a:bodyPr/>
+          <a:lstStyle/>
+          <a:p>
+            <a:r>
+              <a:rPr lang="en-US" altLang="ko-KR" dirty="0"/>
+              <a:t>Test Text is Harry Potter</a:t>
+            </a:r>
+          </a:p>
+          <a:p>
+            <a:r>
+              <a:rPr lang="en-US" altLang="ko-KR" dirty="0"/>
+              <a:t>And I know I should remove</a:t>
+            </a:r>
+          </a:p>
+          <a:p>
+            <a:pPr marL="0" indent="0">
+              <a:buNone/>
+            </a:pPr>
+            <a:r>
+              <a:rPr lang="en-US" altLang="ko-KR" dirty="0"/>
+              <a:t>Duplicate sentence.</a:t>
+            </a:r>
+          </a:p>
+          <a:p>
+            <a:pPr marL="0" indent="0">
+              <a:buNone/>
+            </a:pPr>
+            <a:r>
+              <a:rPr lang="en-US" altLang="ko-KR" dirty="0"/>
+              <a:t>or.. I think This situation is not too bad</a:t>
+            </a:r>
+            <a:endParaRPr lang="ko-KR" altLang="en-US" dirty="0"/>
+          </a:p>
+        </p:txBody>
+      </p:sp>
     </p:spTree>
     <p:extLst>
       <p:ext uri="{BB962C8B-B14F-4D97-AF65-F5344CB8AC3E}">
-        <p14:creationId xmlns:p14="http://schemas.microsoft.com/office/powerpoint/2010/main" val="2843876187"/>
+        <p14:creationId xmlns:p14="http://schemas.microsoft.com/office/powerpoint/2010/main" val="2105677165"/>
       </p:ext>
     </p:extLst>
   </p:cSld>
@@ -9641,7 +9586,7 @@
 </p:sld>
 </file>
 
-<file path=ppt/slides/slide7.xml><?xml version="1.0" encoding="utf-8"?>
+<file path=ppt/slides/slide18.xml><?xml version="1.0" encoding="utf-8"?>
 <p:sld xmlns:a="http://schemas.openxmlformats.org/drawingml/2006/main" xmlns:r="http://schemas.openxmlformats.org/officeDocument/2006/relationships" xmlns:p="http://schemas.openxmlformats.org/presentationml/2006/main">
   <p:cSld>
     <p:spTree>
@@ -9681,14 +9626,14 @@
           <a:p>
             <a:r>
               <a:rPr lang="en-US" altLang="ko-KR" dirty="0"/>
-              <a:t>Ranking (The Degree of Accuracy)</a:t>
+              <a:t>Ranking (Remind)</a:t>
             </a:r>
             <a:endParaRPr lang="ko-KR" altLang="en-US" dirty="0"/>
           </a:p>
         </p:txBody>
       </p:sp>
-      <mc:AlternateContent xmlns:mc="http://schemas.openxmlformats.org/markup-compatibility/2006">
-        <mc:Choice xmlns:a14="http://schemas.microsoft.com/office/drawing/2010/main" Requires="a14">
+      <mc:AlternateContent xmlns:mc="http://schemas.openxmlformats.org/markup-compatibility/2006" xmlns:a14="http://schemas.microsoft.com/office/drawing/2010/main">
+        <mc:Choice Requires="a14">
           <p:sp>
             <p:nvSpPr>
               <p:cNvPr id="3" name="내용 개체 틀 2">
@@ -10197,7 +10142,1625 @@
             </p:txBody>
           </p:sp>
         </mc:Choice>
-        <mc:Fallback>
+        <mc:Fallback xmlns="">
+          <p:sp>
+            <p:nvSpPr>
+              <p:cNvPr id="3" name="내용 개체 틀 2">
+                <a:extLst>
+                  <a:ext uri="{FF2B5EF4-FFF2-40B4-BE49-F238E27FC236}">
+                    <a16:creationId xmlns:a16="http://schemas.microsoft.com/office/drawing/2014/main" id="{F0967C54-D716-44A6-B7BE-43AA5427E333}"/>
+                  </a:ext>
+                </a:extLst>
+              </p:cNvPr>
+              <p:cNvSpPr>
+                <a:spLocks noGrp="1" noRot="1" noChangeAspect="1" noMove="1" noResize="1" noEditPoints="1" noAdjustHandles="1" noChangeArrowheads="1" noChangeShapeType="1" noTextEdit="1"/>
+              </p:cNvSpPr>
+              <p:nvPr>
+                <p:ph idx="1"/>
+              </p:nvPr>
+            </p:nvSpPr>
+            <p:spPr>
+              <a:xfrm>
+                <a:off x="827424" y="1967762"/>
+                <a:ext cx="10554574" cy="4890237"/>
+              </a:xfrm>
+              <a:blipFill>
+                <a:blip r:embed="rId2"/>
+                <a:stretch>
+                  <a:fillRect/>
+                </a:stretch>
+              </a:blipFill>
+            </p:spPr>
+            <p:txBody>
+              <a:bodyPr/>
+              <a:lstStyle/>
+              <a:p>
+                <a:r>
+                  <a:rPr lang="ko-KR" altLang="en-US">
+                    <a:noFill/>
+                  </a:rPr>
+                  <a:t> </a:t>
+                </a:r>
+              </a:p>
+            </p:txBody>
+          </p:sp>
+        </mc:Fallback>
+      </mc:AlternateContent>
+    </p:spTree>
+    <p:extLst>
+      <p:ext uri="{BB962C8B-B14F-4D97-AF65-F5344CB8AC3E}">
+        <p14:creationId xmlns:p14="http://schemas.microsoft.com/office/powerpoint/2010/main" val="3740197719"/>
+      </p:ext>
+    </p:extLst>
+  </p:cSld>
+  <p:clrMapOvr>
+    <a:masterClrMapping/>
+  </p:clrMapOvr>
+</p:sld>
+</file>
+
+<file path=ppt/slides/slide19.xml><?xml version="1.0" encoding="utf-8"?>
+<p:sld xmlns:a="http://schemas.openxmlformats.org/drawingml/2006/main" xmlns:r="http://schemas.openxmlformats.org/officeDocument/2006/relationships" xmlns:p="http://schemas.openxmlformats.org/presentationml/2006/main">
+  <p:cSld>
+    <p:spTree>
+      <p:nvGrpSpPr>
+        <p:cNvPr id="1" name=""/>
+        <p:cNvGrpSpPr/>
+        <p:nvPr/>
+      </p:nvGrpSpPr>
+      <p:grpSpPr>
+        <a:xfrm>
+          <a:off x="0" y="0"/>
+          <a:ext cx="0" cy="0"/>
+          <a:chOff x="0" y="0"/>
+          <a:chExt cx="0" cy="0"/>
+        </a:xfrm>
+      </p:grpSpPr>
+      <p:sp>
+        <p:nvSpPr>
+          <p:cNvPr id="2" name="제목 1">
+            <a:extLst>
+              <a:ext uri="{FF2B5EF4-FFF2-40B4-BE49-F238E27FC236}">
+                <a16:creationId xmlns:a16="http://schemas.microsoft.com/office/drawing/2014/main" id="{00414447-6AC2-43A8-A21D-0965AB43EFEC}"/>
+              </a:ext>
+            </a:extLst>
+          </p:cNvPr>
+          <p:cNvSpPr>
+            <a:spLocks noGrp="1"/>
+          </p:cNvSpPr>
+          <p:nvPr>
+            <p:ph type="title"/>
+          </p:nvPr>
+        </p:nvSpPr>
+        <p:spPr/>
+        <p:txBody>
+          <a:bodyPr/>
+          <a:lstStyle/>
+          <a:p>
+            <a:r>
+              <a:rPr lang="en-US" altLang="ko-KR" dirty="0"/>
+              <a:t>Rank</a:t>
+            </a:r>
+            <a:endParaRPr lang="ko-KR" altLang="en-US" dirty="0"/>
+          </a:p>
+        </p:txBody>
+      </p:sp>
+      <p:sp>
+        <p:nvSpPr>
+          <p:cNvPr id="3" name="내용 개체 틀 2">
+            <a:extLst>
+              <a:ext uri="{FF2B5EF4-FFF2-40B4-BE49-F238E27FC236}">
+                <a16:creationId xmlns:a16="http://schemas.microsoft.com/office/drawing/2014/main" id="{8AC72BF8-38EC-49AB-A70F-F92485D6AFE0}"/>
+              </a:ext>
+            </a:extLst>
+          </p:cNvPr>
+          <p:cNvSpPr>
+            <a:spLocks noGrp="1"/>
+          </p:cNvSpPr>
+          <p:nvPr>
+            <p:ph idx="1"/>
+          </p:nvPr>
+        </p:nvSpPr>
+        <p:spPr/>
+        <p:txBody>
+          <a:bodyPr/>
+          <a:lstStyle/>
+          <a:p>
+            <a:r>
+              <a:rPr lang="en-US" altLang="ko-KR" dirty="0"/>
+              <a:t>Title : W is very </a:t>
+            </a:r>
+            <a:r>
+              <a:rPr lang="en-US" altLang="ko-KR" dirty="0" err="1"/>
+              <a:t>very</a:t>
+            </a:r>
+            <a:r>
+              <a:rPr lang="en-US" altLang="ko-KR" dirty="0"/>
+              <a:t> </a:t>
+            </a:r>
+            <a:r>
+              <a:rPr lang="en-US" altLang="ko-KR" dirty="0" err="1"/>
+              <a:t>very</a:t>
+            </a:r>
+            <a:r>
+              <a:rPr lang="en-US" altLang="ko-KR" dirty="0"/>
+              <a:t> large number (10e5)</a:t>
+            </a:r>
+          </a:p>
+          <a:p>
+            <a:r>
+              <a:rPr lang="en-US" altLang="ko-KR" dirty="0"/>
+              <a:t>Frequency : W = 1</a:t>
+            </a:r>
+          </a:p>
+          <a:p>
+            <a:r>
+              <a:rPr lang="en-US" altLang="ko-KR" dirty="0"/>
+              <a:t>Derivative : W = 0.5 (not sure)</a:t>
+            </a:r>
+          </a:p>
+          <a:p>
+            <a:r>
+              <a:rPr lang="en-US" altLang="ko-KR" dirty="0"/>
+              <a:t>Position of Keyword : Well… I don’t know, I’m reading Linguistic thesis…</a:t>
+            </a:r>
+          </a:p>
+          <a:p>
+            <a:pPr marL="0" indent="0">
+              <a:buNone/>
+            </a:pPr>
+            <a:r>
+              <a:rPr lang="en-US" altLang="ko-KR" dirty="0"/>
+              <a:t>	maybe 0.2? The Sentence’s First word or, last word. </a:t>
+            </a:r>
+          </a:p>
+          <a:p>
+            <a:pPr marL="0" indent="0">
+              <a:buNone/>
+            </a:pPr>
+            <a:endParaRPr lang="en-US" altLang="ko-KR" dirty="0"/>
+          </a:p>
+          <a:p>
+            <a:pPr marL="0" indent="0">
+              <a:buNone/>
+            </a:pPr>
+            <a:r>
+              <a:rPr lang="en-US" altLang="ko-KR" sz="1600" dirty="0"/>
+              <a:t>To be honest, the more I read linguistic thesis, </a:t>
+            </a:r>
+          </a:p>
+          <a:p>
+            <a:pPr marL="0" indent="0">
+              <a:buNone/>
+            </a:pPr>
+            <a:r>
+              <a:rPr lang="en-US" altLang="ko-KR" sz="1600" dirty="0"/>
+              <a:t>the more I think Title is best, Frequency is second best.. And other elements is no great significant.( I tested </a:t>
+            </a:r>
+            <a:r>
+              <a:rPr lang="en-US" altLang="ko-KR" sz="1600"/>
+              <a:t>wikipedia</a:t>
+            </a:r>
+            <a:r>
+              <a:rPr lang="en-US" altLang="ko-KR" sz="1600" dirty="0"/>
+              <a:t> data)</a:t>
+            </a:r>
+          </a:p>
+        </p:txBody>
+      </p:sp>
+    </p:spTree>
+    <p:extLst>
+      <p:ext uri="{BB962C8B-B14F-4D97-AF65-F5344CB8AC3E}">
+        <p14:creationId xmlns:p14="http://schemas.microsoft.com/office/powerpoint/2010/main" val="4000016872"/>
+      </p:ext>
+    </p:extLst>
+  </p:cSld>
+  <p:clrMapOvr>
+    <a:masterClrMapping/>
+  </p:clrMapOvr>
+</p:sld>
+</file>
+
+<file path=ppt/slides/slide2.xml><?xml version="1.0" encoding="utf-8"?>
+<p:sld xmlns:a="http://schemas.openxmlformats.org/drawingml/2006/main" xmlns:r="http://schemas.openxmlformats.org/officeDocument/2006/relationships" xmlns:p="http://schemas.openxmlformats.org/presentationml/2006/main">
+  <p:cSld>
+    <p:spTree>
+      <p:nvGrpSpPr>
+        <p:cNvPr id="1" name=""/>
+        <p:cNvGrpSpPr/>
+        <p:nvPr/>
+      </p:nvGrpSpPr>
+      <p:grpSpPr>
+        <a:xfrm>
+          <a:off x="0" y="0"/>
+          <a:ext cx="0" cy="0"/>
+          <a:chOff x="0" y="0"/>
+          <a:chExt cx="0" cy="0"/>
+        </a:xfrm>
+      </p:grpSpPr>
+      <p:sp>
+        <p:nvSpPr>
+          <p:cNvPr id="6" name="제목 5">
+            <a:extLst>
+              <a:ext uri="{FF2B5EF4-FFF2-40B4-BE49-F238E27FC236}">
+                <a16:creationId xmlns:a16="http://schemas.microsoft.com/office/drawing/2014/main" id="{1185B7F2-F58B-42A3-9215-F03903B406E1}"/>
+              </a:ext>
+            </a:extLst>
+          </p:cNvPr>
+          <p:cNvSpPr>
+            <a:spLocks noGrp="1"/>
+          </p:cNvSpPr>
+          <p:nvPr>
+            <p:ph type="title"/>
+          </p:nvPr>
+        </p:nvSpPr>
+        <p:spPr/>
+        <p:txBody>
+          <a:bodyPr/>
+          <a:lstStyle/>
+          <a:p>
+            <a:r>
+              <a:rPr lang="en-US" altLang="ko-KR" dirty="0"/>
+              <a:t>Problem modeling</a:t>
+            </a:r>
+            <a:endParaRPr lang="ko-KR" altLang="en-US" dirty="0"/>
+          </a:p>
+        </p:txBody>
+      </p:sp>
+      <p:sp>
+        <p:nvSpPr>
+          <p:cNvPr id="7" name="텍스트 개체 틀 6">
+            <a:extLst>
+              <a:ext uri="{FF2B5EF4-FFF2-40B4-BE49-F238E27FC236}">
+                <a16:creationId xmlns:a16="http://schemas.microsoft.com/office/drawing/2014/main" id="{DD7E4467-8EDE-4B41-B2D6-EAAB1481EE2A}"/>
+              </a:ext>
+            </a:extLst>
+          </p:cNvPr>
+          <p:cNvSpPr>
+            <a:spLocks noGrp="1"/>
+          </p:cNvSpPr>
+          <p:nvPr>
+            <p:ph type="body" idx="1"/>
+          </p:nvPr>
+        </p:nvSpPr>
+        <p:spPr/>
+        <p:txBody>
+          <a:bodyPr/>
+          <a:lstStyle/>
+          <a:p>
+            <a:r>
+              <a:rPr lang="en-US" altLang="ko-KR" dirty="0"/>
+              <a:t>Nov 3 – 1</a:t>
+            </a:r>
+            <a:r>
+              <a:rPr lang="en-US" altLang="ko-KR" baseline="30000" dirty="0"/>
+              <a:t>st</a:t>
+            </a:r>
+            <a:r>
+              <a:rPr lang="en-US" altLang="ko-KR" dirty="0"/>
+              <a:t> presentation</a:t>
+            </a:r>
+            <a:endParaRPr lang="ko-KR" altLang="en-US" dirty="0"/>
+          </a:p>
+        </p:txBody>
+      </p:sp>
+    </p:spTree>
+    <p:extLst>
+      <p:ext uri="{BB962C8B-B14F-4D97-AF65-F5344CB8AC3E}">
+        <p14:creationId xmlns:p14="http://schemas.microsoft.com/office/powerpoint/2010/main" val="2761875237"/>
+      </p:ext>
+    </p:extLst>
+  </p:cSld>
+  <p:clrMapOvr>
+    <a:masterClrMapping/>
+  </p:clrMapOvr>
+</p:sld>
+</file>
+
+<file path=ppt/slides/slide3.xml><?xml version="1.0" encoding="utf-8"?>
+<p:sld xmlns:a="http://schemas.openxmlformats.org/drawingml/2006/main" xmlns:r="http://schemas.openxmlformats.org/officeDocument/2006/relationships" xmlns:p="http://schemas.openxmlformats.org/presentationml/2006/main">
+  <p:cSld>
+    <p:spTree>
+      <p:nvGrpSpPr>
+        <p:cNvPr id="1" name=""/>
+        <p:cNvGrpSpPr/>
+        <p:nvPr/>
+      </p:nvGrpSpPr>
+      <p:grpSpPr>
+        <a:xfrm>
+          <a:off x="0" y="0"/>
+          <a:ext cx="0" cy="0"/>
+          <a:chOff x="0" y="0"/>
+          <a:chExt cx="0" cy="0"/>
+        </a:xfrm>
+      </p:grpSpPr>
+      <p:sp>
+        <p:nvSpPr>
+          <p:cNvPr id="2" name="제목 1">
+            <a:extLst>
+              <a:ext uri="{FF2B5EF4-FFF2-40B4-BE49-F238E27FC236}">
+                <a16:creationId xmlns:a16="http://schemas.microsoft.com/office/drawing/2014/main" id="{DE30E5D8-13A2-43D9-B9BD-60DA24B9F1D8}"/>
+              </a:ext>
+            </a:extLst>
+          </p:cNvPr>
+          <p:cNvSpPr>
+            <a:spLocks noGrp="1"/>
+          </p:cNvSpPr>
+          <p:nvPr>
+            <p:ph type="title"/>
+          </p:nvPr>
+        </p:nvSpPr>
+        <p:spPr/>
+        <p:txBody>
+          <a:bodyPr/>
+          <a:lstStyle/>
+          <a:p>
+            <a:r>
+              <a:rPr lang="en-US" altLang="ko-KR" dirty="0"/>
+              <a:t>Focus</a:t>
+            </a:r>
+            <a:endParaRPr lang="ko-KR" altLang="en-US" dirty="0"/>
+          </a:p>
+        </p:txBody>
+      </p:sp>
+      <p:sp>
+        <p:nvSpPr>
+          <p:cNvPr id="3" name="내용 개체 틀 2">
+            <a:extLst>
+              <a:ext uri="{FF2B5EF4-FFF2-40B4-BE49-F238E27FC236}">
+                <a16:creationId xmlns:a16="http://schemas.microsoft.com/office/drawing/2014/main" id="{7C3ACE1D-47A2-49BB-8605-358B4E41CCF1}"/>
+              </a:ext>
+            </a:extLst>
+          </p:cNvPr>
+          <p:cNvSpPr>
+            <a:spLocks noGrp="1"/>
+          </p:cNvSpPr>
+          <p:nvPr>
+            <p:ph idx="1"/>
+          </p:nvPr>
+        </p:nvSpPr>
+        <p:spPr/>
+        <p:txBody>
+          <a:bodyPr>
+            <a:normAutofit/>
+          </a:bodyPr>
+          <a:lstStyle/>
+          <a:p>
+            <a:r>
+              <a:rPr lang="en-US" altLang="ko-KR" sz="2800" dirty="0"/>
+              <a:t>The Degree of Accuracy</a:t>
+            </a:r>
+          </a:p>
+          <a:p>
+            <a:r>
+              <a:rPr lang="en-US" altLang="ko-KR" sz="2800" dirty="0"/>
+              <a:t>Scale Issue (Memory &amp; Speed)</a:t>
+            </a:r>
+          </a:p>
+        </p:txBody>
+      </p:sp>
+    </p:spTree>
+    <p:extLst>
+      <p:ext uri="{BB962C8B-B14F-4D97-AF65-F5344CB8AC3E}">
+        <p14:creationId xmlns:p14="http://schemas.microsoft.com/office/powerpoint/2010/main" val="1145740769"/>
+      </p:ext>
+    </p:extLst>
+  </p:cSld>
+  <p:clrMapOvr>
+    <a:masterClrMapping/>
+  </p:clrMapOvr>
+</p:sld>
+</file>
+
+<file path=ppt/slides/slide4.xml><?xml version="1.0" encoding="utf-8"?>
+<p:sld xmlns:a="http://schemas.openxmlformats.org/drawingml/2006/main" xmlns:r="http://schemas.openxmlformats.org/officeDocument/2006/relationships" xmlns:p="http://schemas.openxmlformats.org/presentationml/2006/main">
+  <p:cSld>
+    <p:spTree>
+      <p:nvGrpSpPr>
+        <p:cNvPr id="1" name=""/>
+        <p:cNvGrpSpPr/>
+        <p:nvPr/>
+      </p:nvGrpSpPr>
+      <p:grpSpPr>
+        <a:xfrm>
+          <a:off x="0" y="0"/>
+          <a:ext cx="0" cy="0"/>
+          <a:chOff x="0" y="0"/>
+          <a:chExt cx="0" cy="0"/>
+        </a:xfrm>
+      </p:grpSpPr>
+      <p:sp>
+        <p:nvSpPr>
+          <p:cNvPr id="2" name="제목 1">
+            <a:extLst>
+              <a:ext uri="{FF2B5EF4-FFF2-40B4-BE49-F238E27FC236}">
+                <a16:creationId xmlns:a16="http://schemas.microsoft.com/office/drawing/2014/main" id="{0C689FF7-1300-4F3D-B5DA-76F499846E79}"/>
+              </a:ext>
+            </a:extLst>
+          </p:cNvPr>
+          <p:cNvSpPr>
+            <a:spLocks noGrp="1"/>
+          </p:cNvSpPr>
+          <p:nvPr>
+            <p:ph type="title"/>
+          </p:nvPr>
+        </p:nvSpPr>
+        <p:spPr/>
+        <p:txBody>
+          <a:bodyPr/>
+          <a:lstStyle/>
+          <a:p>
+            <a:endParaRPr lang="ko-KR" altLang="en-US" dirty="0"/>
+          </a:p>
+        </p:txBody>
+      </p:sp>
+      <p:graphicFrame>
+        <p:nvGraphicFramePr>
+          <p:cNvPr id="4" name="내용 개체 틀 3">
+            <a:extLst>
+              <a:ext uri="{FF2B5EF4-FFF2-40B4-BE49-F238E27FC236}">
+                <a16:creationId xmlns:a16="http://schemas.microsoft.com/office/drawing/2014/main" id="{995BB9E7-B6AA-4BA0-9859-B12982EA93BF}"/>
+              </a:ext>
+            </a:extLst>
+          </p:cNvPr>
+          <p:cNvGraphicFramePr>
+            <a:graphicFrameLocks noGrp="1"/>
+          </p:cNvGraphicFramePr>
+          <p:nvPr>
+            <p:ph idx="1"/>
+            <p:extLst>
+              <p:ext uri="{D42A27DB-BD31-4B8C-83A1-F6EECF244321}">
+                <p14:modId xmlns:p14="http://schemas.microsoft.com/office/powerpoint/2010/main" val="3948990566"/>
+              </p:ext>
+            </p:extLst>
+          </p:nvPr>
+        </p:nvGraphicFramePr>
+        <p:xfrm>
+          <a:off x="819150" y="2222500"/>
+          <a:ext cx="10553700" cy="3636963"/>
+        </p:xfrm>
+        <a:graphic>
+          <a:graphicData uri="http://schemas.openxmlformats.org/drawingml/2006/diagram">
+            <dgm:relIds xmlns:dgm="http://schemas.openxmlformats.org/drawingml/2006/diagram" xmlns:r="http://schemas.openxmlformats.org/officeDocument/2006/relationships" r:dm="rId2" r:lo="rId3" r:qs="rId4" r:cs="rId5"/>
+          </a:graphicData>
+        </a:graphic>
+      </p:graphicFrame>
+    </p:spTree>
+    <p:extLst>
+      <p:ext uri="{BB962C8B-B14F-4D97-AF65-F5344CB8AC3E}">
+        <p14:creationId xmlns:p14="http://schemas.microsoft.com/office/powerpoint/2010/main" val="887975944"/>
+      </p:ext>
+    </p:extLst>
+  </p:cSld>
+  <p:clrMapOvr>
+    <a:masterClrMapping/>
+  </p:clrMapOvr>
+</p:sld>
+</file>
+
+<file path=ppt/slides/slide5.xml><?xml version="1.0" encoding="utf-8"?>
+<p:sld xmlns:a="http://schemas.openxmlformats.org/drawingml/2006/main" xmlns:r="http://schemas.openxmlformats.org/officeDocument/2006/relationships" xmlns:p="http://schemas.openxmlformats.org/presentationml/2006/main">
+  <p:cSld>
+    <p:spTree>
+      <p:nvGrpSpPr>
+        <p:cNvPr id="1" name=""/>
+        <p:cNvGrpSpPr/>
+        <p:nvPr/>
+      </p:nvGrpSpPr>
+      <p:grpSpPr>
+        <a:xfrm>
+          <a:off x="0" y="0"/>
+          <a:ext cx="0" cy="0"/>
+          <a:chOff x="0" y="0"/>
+          <a:chExt cx="0" cy="0"/>
+        </a:xfrm>
+      </p:grpSpPr>
+      <p:sp>
+        <p:nvSpPr>
+          <p:cNvPr id="2" name="제목 1">
+            <a:extLst>
+              <a:ext uri="{FF2B5EF4-FFF2-40B4-BE49-F238E27FC236}">
+                <a16:creationId xmlns:a16="http://schemas.microsoft.com/office/drawing/2014/main" id="{C3D80261-8AFC-417B-BB1B-D463939599F1}"/>
+              </a:ext>
+            </a:extLst>
+          </p:cNvPr>
+          <p:cNvSpPr>
+            <a:spLocks noGrp="1"/>
+          </p:cNvSpPr>
+          <p:nvPr>
+            <p:ph type="title"/>
+          </p:nvPr>
+        </p:nvSpPr>
+        <p:spPr/>
+        <p:txBody>
+          <a:bodyPr/>
+          <a:lstStyle/>
+          <a:p>
+            <a:r>
+              <a:rPr lang="en-US" altLang="ko-KR" dirty="0"/>
+              <a:t>Flow Chart</a:t>
+            </a:r>
+            <a:endParaRPr lang="ko-KR" altLang="en-US" dirty="0"/>
+          </a:p>
+        </p:txBody>
+      </p:sp>
+      <p:sp>
+        <p:nvSpPr>
+          <p:cNvPr id="3" name="내용 개체 틀 2">
+            <a:extLst>
+              <a:ext uri="{FF2B5EF4-FFF2-40B4-BE49-F238E27FC236}">
+                <a16:creationId xmlns:a16="http://schemas.microsoft.com/office/drawing/2014/main" id="{88B0F32B-23CB-41AB-88F1-3DDCF32CDA59}"/>
+              </a:ext>
+            </a:extLst>
+          </p:cNvPr>
+          <p:cNvSpPr>
+            <a:spLocks noGrp="1"/>
+          </p:cNvSpPr>
+          <p:nvPr>
+            <p:ph idx="1"/>
+          </p:nvPr>
+        </p:nvSpPr>
+        <p:spPr/>
+        <p:txBody>
+          <a:bodyPr/>
+          <a:lstStyle/>
+          <a:p>
+            <a:endParaRPr lang="ko-KR" altLang="en-US" dirty="0"/>
+          </a:p>
+        </p:txBody>
+      </p:sp>
+      <p:pic>
+        <p:nvPicPr>
+          <p:cNvPr id="4" name="그림 3">
+            <a:extLst>
+              <a:ext uri="{FF2B5EF4-FFF2-40B4-BE49-F238E27FC236}">
+                <a16:creationId xmlns:a16="http://schemas.microsoft.com/office/drawing/2014/main" id="{43AF3812-CB4B-44CC-A900-CC7D4A2D722F}"/>
+              </a:ext>
+            </a:extLst>
+          </p:cNvPr>
+          <p:cNvPicPr>
+            <a:picLocks noChangeAspect="1"/>
+          </p:cNvPicPr>
+          <p:nvPr/>
+        </p:nvPicPr>
+        <p:blipFill>
+          <a:blip r:embed="rId2"/>
+          <a:stretch>
+            <a:fillRect/>
+          </a:stretch>
+        </p:blipFill>
+        <p:spPr>
+          <a:xfrm>
+            <a:off x="4537630" y="0"/>
+            <a:ext cx="4653504" cy="6767856"/>
+          </a:xfrm>
+          <a:prstGeom prst="rect">
+            <a:avLst/>
+          </a:prstGeom>
+        </p:spPr>
+      </p:pic>
+    </p:spTree>
+    <p:extLst>
+      <p:ext uri="{BB962C8B-B14F-4D97-AF65-F5344CB8AC3E}">
+        <p14:creationId xmlns:p14="http://schemas.microsoft.com/office/powerpoint/2010/main" val="2216799287"/>
+      </p:ext>
+    </p:extLst>
+  </p:cSld>
+  <p:clrMapOvr>
+    <a:masterClrMapping/>
+  </p:clrMapOvr>
+</p:sld>
+</file>
+
+<file path=ppt/slides/slide6.xml><?xml version="1.0" encoding="utf-8"?>
+<p:sld xmlns:a="http://schemas.openxmlformats.org/drawingml/2006/main" xmlns:r="http://schemas.openxmlformats.org/officeDocument/2006/relationships" xmlns:p="http://schemas.openxmlformats.org/presentationml/2006/main">
+  <p:cSld>
+    <p:spTree>
+      <p:nvGrpSpPr>
+        <p:cNvPr id="1" name=""/>
+        <p:cNvGrpSpPr/>
+        <p:nvPr/>
+      </p:nvGrpSpPr>
+      <p:grpSpPr>
+        <a:xfrm>
+          <a:off x="0" y="0"/>
+          <a:ext cx="0" cy="0"/>
+          <a:chOff x="0" y="0"/>
+          <a:chExt cx="0" cy="0"/>
+        </a:xfrm>
+      </p:grpSpPr>
+      <p:sp>
+        <p:nvSpPr>
+          <p:cNvPr id="2" name="제목 1">
+            <a:extLst>
+              <a:ext uri="{FF2B5EF4-FFF2-40B4-BE49-F238E27FC236}">
+                <a16:creationId xmlns:a16="http://schemas.microsoft.com/office/drawing/2014/main" id="{2C01AB32-7341-4434-AF17-746D4E5193A1}"/>
+              </a:ext>
+            </a:extLst>
+          </p:cNvPr>
+          <p:cNvSpPr>
+            <a:spLocks noGrp="1"/>
+          </p:cNvSpPr>
+          <p:nvPr>
+            <p:ph type="title"/>
+          </p:nvPr>
+        </p:nvSpPr>
+        <p:spPr/>
+        <p:txBody>
+          <a:bodyPr/>
+          <a:lstStyle/>
+          <a:p>
+            <a:r>
+              <a:rPr lang="en-US" altLang="ko-KR" dirty="0"/>
+              <a:t>Get File List</a:t>
+            </a:r>
+            <a:endParaRPr lang="ko-KR" altLang="en-US" dirty="0"/>
+          </a:p>
+        </p:txBody>
+      </p:sp>
+      <p:sp>
+        <p:nvSpPr>
+          <p:cNvPr id="3" name="내용 개체 틀 2">
+            <a:extLst>
+              <a:ext uri="{FF2B5EF4-FFF2-40B4-BE49-F238E27FC236}">
+                <a16:creationId xmlns:a16="http://schemas.microsoft.com/office/drawing/2014/main" id="{A76D372C-7A8B-4709-9D34-329D950A0106}"/>
+              </a:ext>
+            </a:extLst>
+          </p:cNvPr>
+          <p:cNvSpPr>
+            <a:spLocks noGrp="1"/>
+          </p:cNvSpPr>
+          <p:nvPr>
+            <p:ph idx="1"/>
+          </p:nvPr>
+        </p:nvSpPr>
+        <p:spPr/>
+        <p:txBody>
+          <a:bodyPr/>
+          <a:lstStyle/>
+          <a:p>
+            <a:r>
+              <a:rPr lang="en-US" altLang="ko-KR" dirty="0" err="1"/>
+              <a:t>io.h</a:t>
+            </a:r>
+            <a:endParaRPr lang="en-US" altLang="ko-KR" dirty="0"/>
+          </a:p>
+          <a:p>
+            <a:r>
+              <a:rPr lang="en-US" altLang="ko-KR" dirty="0"/>
+              <a:t>long _</a:t>
+            </a:r>
+            <a:r>
+              <a:rPr lang="en-US" altLang="ko-KR" dirty="0" err="1"/>
+              <a:t>findfirst</a:t>
+            </a:r>
+            <a:r>
+              <a:rPr lang="en-US" altLang="ko-KR" dirty="0"/>
+              <a:t>(char *</a:t>
+            </a:r>
+            <a:r>
+              <a:rPr lang="en-US" altLang="ko-KR" dirty="0" err="1"/>
+              <a:t>filespec</a:t>
+            </a:r>
+            <a:r>
+              <a:rPr lang="en-US" altLang="ko-KR" dirty="0"/>
+              <a:t>, struct _</a:t>
+            </a:r>
+            <a:r>
+              <a:rPr lang="en-US" altLang="ko-KR" dirty="0" err="1"/>
+              <a:t>findata_at</a:t>
+            </a:r>
+            <a:r>
+              <a:rPr lang="en-US" altLang="ko-KR" dirty="0"/>
+              <a:t> *</a:t>
+            </a:r>
+            <a:r>
+              <a:rPr lang="en-US" altLang="ko-KR" dirty="0" err="1"/>
+              <a:t>fileinfo</a:t>
+            </a:r>
+            <a:r>
+              <a:rPr lang="en-US" altLang="ko-KR" dirty="0"/>
+              <a:t>);</a:t>
+            </a:r>
+          </a:p>
+          <a:p>
+            <a:r>
+              <a:rPr lang="en-US" altLang="ko-KR" dirty="0" err="1"/>
+              <a:t>int</a:t>
+            </a:r>
+            <a:r>
+              <a:rPr lang="en-US" altLang="ko-KR" dirty="0"/>
+              <a:t> _</a:t>
+            </a:r>
+            <a:r>
+              <a:rPr lang="en-US" altLang="ko-KR" dirty="0" err="1"/>
+              <a:t>findnect</a:t>
+            </a:r>
+            <a:r>
+              <a:rPr lang="en-US" altLang="ko-KR" dirty="0"/>
+              <a:t>(long handle, struct _</a:t>
+            </a:r>
+            <a:r>
+              <a:rPr lang="en-US" altLang="ko-KR" dirty="0" err="1"/>
+              <a:t>finddata_t</a:t>
+            </a:r>
+            <a:r>
+              <a:rPr lang="en-US" altLang="ko-KR" dirty="0"/>
+              <a:t> *</a:t>
+            </a:r>
+            <a:r>
+              <a:rPr lang="en-US" altLang="ko-KR" dirty="0" err="1"/>
+              <a:t>fileinfo</a:t>
+            </a:r>
+            <a:r>
+              <a:rPr lang="en-US" altLang="ko-KR" dirty="0"/>
+              <a:t>);</a:t>
+            </a:r>
+          </a:p>
+          <a:p>
+            <a:r>
+              <a:rPr lang="en-US" altLang="ko-KR" dirty="0" err="1"/>
+              <a:t>int</a:t>
+            </a:r>
+            <a:r>
+              <a:rPr lang="en-US" altLang="ko-KR" dirty="0"/>
+              <a:t> _</a:t>
+            </a:r>
+            <a:r>
+              <a:rPr lang="en-US" altLang="ko-KR" dirty="0" err="1"/>
+              <a:t>findclose</a:t>
+            </a:r>
+            <a:r>
+              <a:rPr lang="en-US" altLang="ko-KR" dirty="0"/>
+              <a:t>(long handle);</a:t>
+            </a:r>
+            <a:endParaRPr lang="ko-KR" altLang="en-US" dirty="0"/>
+          </a:p>
+        </p:txBody>
+      </p:sp>
+    </p:spTree>
+    <p:extLst>
+      <p:ext uri="{BB962C8B-B14F-4D97-AF65-F5344CB8AC3E}">
+        <p14:creationId xmlns:p14="http://schemas.microsoft.com/office/powerpoint/2010/main" val="3604949291"/>
+      </p:ext>
+    </p:extLst>
+  </p:cSld>
+  <p:clrMapOvr>
+    <a:masterClrMapping/>
+  </p:clrMapOvr>
+</p:sld>
+</file>
+
+<file path=ppt/slides/slide7.xml><?xml version="1.0" encoding="utf-8"?>
+<p:sld xmlns:a="http://schemas.openxmlformats.org/drawingml/2006/main" xmlns:r="http://schemas.openxmlformats.org/officeDocument/2006/relationships" xmlns:p="http://schemas.openxmlformats.org/presentationml/2006/main">
+  <p:cSld>
+    <p:spTree>
+      <p:nvGrpSpPr>
+        <p:cNvPr id="1" name=""/>
+        <p:cNvGrpSpPr/>
+        <p:nvPr/>
+      </p:nvGrpSpPr>
+      <p:grpSpPr>
+        <a:xfrm>
+          <a:off x="0" y="0"/>
+          <a:ext cx="0" cy="0"/>
+          <a:chOff x="0" y="0"/>
+          <a:chExt cx="0" cy="0"/>
+        </a:xfrm>
+      </p:grpSpPr>
+      <p:sp>
+        <p:nvSpPr>
+          <p:cNvPr id="2" name="제목 1">
+            <a:extLst>
+              <a:ext uri="{FF2B5EF4-FFF2-40B4-BE49-F238E27FC236}">
+                <a16:creationId xmlns:a16="http://schemas.microsoft.com/office/drawing/2014/main" id="{4B158C55-8274-4877-AC52-1CA96A1F081C}"/>
+              </a:ext>
+            </a:extLst>
+          </p:cNvPr>
+          <p:cNvSpPr>
+            <a:spLocks noGrp="1"/>
+          </p:cNvSpPr>
+          <p:nvPr>
+            <p:ph type="title"/>
+          </p:nvPr>
+        </p:nvSpPr>
+        <p:spPr/>
+        <p:txBody>
+          <a:bodyPr/>
+          <a:lstStyle/>
+          <a:p>
+            <a:r>
+              <a:rPr lang="en-US" altLang="ko-KR" dirty="0"/>
+              <a:t>Pattern Search</a:t>
+            </a:r>
+            <a:endParaRPr lang="ko-KR" altLang="en-US" dirty="0"/>
+          </a:p>
+        </p:txBody>
+      </p:sp>
+      <mc:AlternateContent xmlns:mc="http://schemas.openxmlformats.org/markup-compatibility/2006" xmlns:a14="http://schemas.microsoft.com/office/drawing/2010/main">
+        <mc:Choice Requires="a14">
+          <p:sp>
+            <p:nvSpPr>
+              <p:cNvPr id="3" name="내용 개체 틀 2">
+                <a:extLst>
+                  <a:ext uri="{FF2B5EF4-FFF2-40B4-BE49-F238E27FC236}">
+                    <a16:creationId xmlns:a16="http://schemas.microsoft.com/office/drawing/2014/main" id="{ACD1CD8A-EC15-407F-A8E0-DAAF58FAA763}"/>
+                  </a:ext>
+                </a:extLst>
+              </p:cNvPr>
+              <p:cNvSpPr>
+                <a:spLocks noGrp="1"/>
+              </p:cNvSpPr>
+              <p:nvPr>
+                <p:ph idx="1"/>
+              </p:nvPr>
+            </p:nvSpPr>
+            <p:spPr/>
+            <p:txBody>
+              <a:bodyPr/>
+              <a:lstStyle/>
+              <a:p>
+                <a:r>
+                  <a:rPr lang="en-US" altLang="ko-KR" dirty="0"/>
+                  <a:t>s</a:t>
+                </a:r>
+                <a:r>
+                  <a:rPr lang="en-US" altLang="ko-KR" dirty="0" err="1"/>
+                  <a:t>tring.h</a:t>
+                </a:r>
+                <a:r>
+                  <a:rPr lang="en-US" altLang="ko-KR" dirty="0"/>
+                  <a:t> </a:t>
+                </a:r>
+              </a:p>
+              <a:p>
+                <a:r>
+                  <a:rPr lang="en-US" altLang="ko-KR" dirty="0" err="1"/>
+                  <a:t>const</a:t>
+                </a:r>
+                <a:r>
+                  <a:rPr lang="en-US" altLang="ko-KR" dirty="0"/>
+                  <a:t> char * </a:t>
+                </a:r>
+                <a:r>
+                  <a:rPr lang="en-US" altLang="ko-KR" dirty="0" err="1"/>
+                  <a:t>strstr</a:t>
+                </a:r>
+                <a:r>
+                  <a:rPr lang="en-US" altLang="ko-KR" dirty="0"/>
+                  <a:t> ( </a:t>
+                </a:r>
+                <a:r>
+                  <a:rPr lang="en-US" altLang="ko-KR" dirty="0" err="1"/>
+                  <a:t>const</a:t>
+                </a:r>
+                <a:r>
+                  <a:rPr lang="en-US" altLang="ko-KR" dirty="0"/>
+                  <a:t> char * str1, </a:t>
+                </a:r>
+                <a:r>
+                  <a:rPr lang="en-US" altLang="ko-KR" dirty="0" err="1"/>
+                  <a:t>const</a:t>
+                </a:r>
+                <a:r>
+                  <a:rPr lang="en-US" altLang="ko-KR" dirty="0"/>
+                  <a:t> char * str2 );</a:t>
+                </a:r>
+              </a:p>
+              <a:p>
+                <a:r>
+                  <a:rPr lang="en-US" altLang="ko-KR" dirty="0" err="1"/>
+                  <a:t>strstr</a:t>
+                </a:r>
+                <a:r>
+                  <a:rPr lang="ko-KR" altLang="en-US" dirty="0"/>
+                  <a:t> </a:t>
+                </a:r>
+                <a:r>
+                  <a:rPr lang="en-US" altLang="ko-KR" dirty="0"/>
+                  <a:t>function principle</a:t>
+                </a:r>
+                <a:r>
+                  <a:rPr lang="ko-KR" altLang="en-US" dirty="0"/>
+                  <a:t> </a:t>
+                </a:r>
+                <a:r>
+                  <a:rPr lang="en-US" altLang="ko-KR" dirty="0"/>
+                  <a:t>: </a:t>
+                </a:r>
+                <a:r>
+                  <a:rPr lang="en-US" altLang="ko-KR" dirty="0" err="1"/>
+                  <a:t>kmp</a:t>
+                </a:r>
+                <a:r>
+                  <a:rPr lang="en-US" altLang="ko-KR" dirty="0"/>
+                  <a:t> + </a:t>
+                </a:r>
+                <a14:m>
+                  <m:oMath xmlns:m="http://schemas.openxmlformats.org/officeDocument/2006/math">
+                    <m:r>
+                      <m:rPr>
+                        <m:sty m:val="p"/>
+                      </m:rPr>
+                      <a:rPr lang="en-US" altLang="ko-KR" b="0" i="1" smtClean="0">
+                        <a:latin typeface="Cambria Math" panose="02040503050406030204" pitchFamily="18" charset="0"/>
+                      </a:rPr>
+                      <m:t>α</m:t>
+                    </m:r>
+                  </m:oMath>
+                </a14:m>
+                <a:endParaRPr lang="en-US" altLang="ko-KR" dirty="0"/>
+              </a:p>
+              <a:p>
+                <a:r>
+                  <a:rPr lang="en-US" altLang="ko-KR" dirty="0" err="1"/>
+                  <a:t>kmp</a:t>
+                </a:r>
+                <a:r>
+                  <a:rPr lang="en-US" altLang="ko-KR" dirty="0"/>
+                  <a:t> algorithm</a:t>
+                </a:r>
+              </a:p>
+              <a:p>
+                <a:r>
+                  <a:rPr lang="en-US" altLang="ko-KR" dirty="0"/>
+                  <a:t>Save char* data in </a:t>
+                </a:r>
+                <a:r>
+                  <a:rPr lang="en-US" altLang="ko-KR" dirty="0" err="1"/>
+                  <a:t>LinkedList</a:t>
+                </a:r>
+                <a:r>
+                  <a:rPr lang="en-US" altLang="ko-KR" dirty="0"/>
+                  <a:t> (because of convenience of ranking)</a:t>
+                </a:r>
+              </a:p>
+              <a:p>
+                <a:endParaRPr lang="en-US" altLang="ko-KR" dirty="0"/>
+              </a:p>
+            </p:txBody>
+          </p:sp>
+        </mc:Choice>
+        <mc:Fallback xmlns="">
+          <p:sp>
+            <p:nvSpPr>
+              <p:cNvPr id="3" name="내용 개체 틀 2">
+                <a:extLst>
+                  <a:ext uri="{FF2B5EF4-FFF2-40B4-BE49-F238E27FC236}">
+                    <a16:creationId xmlns:a16="http://schemas.microsoft.com/office/drawing/2014/main" id="{ACD1CD8A-EC15-407F-A8E0-DAAF58FAA763}"/>
+                  </a:ext>
+                </a:extLst>
+              </p:cNvPr>
+              <p:cNvSpPr>
+                <a:spLocks noGrp="1" noRot="1" noChangeAspect="1" noMove="1" noResize="1" noEditPoints="1" noAdjustHandles="1" noChangeArrowheads="1" noChangeShapeType="1" noTextEdit="1"/>
+              </p:cNvSpPr>
+              <p:nvPr>
+                <p:ph idx="1"/>
+              </p:nvPr>
+            </p:nvSpPr>
+            <p:spPr>
+              <a:blipFill>
+                <a:blip r:embed="rId2"/>
+                <a:stretch>
+                  <a:fillRect/>
+                </a:stretch>
+              </a:blipFill>
+            </p:spPr>
+            <p:txBody>
+              <a:bodyPr/>
+              <a:lstStyle/>
+              <a:p>
+                <a:r>
+                  <a:rPr lang="ko-KR" altLang="en-US">
+                    <a:noFill/>
+                  </a:rPr>
+                  <a:t> </a:t>
+                </a:r>
+              </a:p>
+            </p:txBody>
+          </p:sp>
+        </mc:Fallback>
+      </mc:AlternateContent>
+      <p:pic>
+        <p:nvPicPr>
+          <p:cNvPr id="5" name="그림 4">
+            <a:extLst>
+              <a:ext uri="{FF2B5EF4-FFF2-40B4-BE49-F238E27FC236}">
+                <a16:creationId xmlns:a16="http://schemas.microsoft.com/office/drawing/2014/main" id="{420CA423-8DC5-44B2-BEDB-F9A5F9F05223}"/>
+              </a:ext>
+            </a:extLst>
+          </p:cNvPr>
+          <p:cNvPicPr>
+            <a:picLocks noChangeAspect="1"/>
+          </p:cNvPicPr>
+          <p:nvPr/>
+        </p:nvPicPr>
+        <p:blipFill>
+          <a:blip r:embed="rId3"/>
+          <a:stretch>
+            <a:fillRect/>
+          </a:stretch>
+        </p:blipFill>
+        <p:spPr>
+          <a:xfrm>
+            <a:off x="7887556" y="932413"/>
+            <a:ext cx="3792699" cy="3328287"/>
+          </a:xfrm>
+          <a:prstGeom prst="rect">
+            <a:avLst/>
+          </a:prstGeom>
+        </p:spPr>
+      </p:pic>
+    </p:spTree>
+    <p:extLst>
+      <p:ext uri="{BB962C8B-B14F-4D97-AF65-F5344CB8AC3E}">
+        <p14:creationId xmlns:p14="http://schemas.microsoft.com/office/powerpoint/2010/main" val="2843876187"/>
+      </p:ext>
+    </p:extLst>
+  </p:cSld>
+  <p:clrMapOvr>
+    <a:masterClrMapping/>
+  </p:clrMapOvr>
+</p:sld>
+</file>
+
+<file path=ppt/slides/slide8.xml><?xml version="1.0" encoding="utf-8"?>
+<p:sld xmlns:a="http://schemas.openxmlformats.org/drawingml/2006/main" xmlns:r="http://schemas.openxmlformats.org/officeDocument/2006/relationships" xmlns:p="http://schemas.openxmlformats.org/presentationml/2006/main">
+  <p:cSld>
+    <p:spTree>
+      <p:nvGrpSpPr>
+        <p:cNvPr id="1" name=""/>
+        <p:cNvGrpSpPr/>
+        <p:nvPr/>
+      </p:nvGrpSpPr>
+      <p:grpSpPr>
+        <a:xfrm>
+          <a:off x="0" y="0"/>
+          <a:ext cx="0" cy="0"/>
+          <a:chOff x="0" y="0"/>
+          <a:chExt cx="0" cy="0"/>
+        </a:xfrm>
+      </p:grpSpPr>
+      <p:sp>
+        <p:nvSpPr>
+          <p:cNvPr id="2" name="제목 1">
+            <a:extLst>
+              <a:ext uri="{FF2B5EF4-FFF2-40B4-BE49-F238E27FC236}">
+                <a16:creationId xmlns:a16="http://schemas.microsoft.com/office/drawing/2014/main" id="{36102968-B5F5-443D-949F-47ECE8D16D24}"/>
+              </a:ext>
+            </a:extLst>
+          </p:cNvPr>
+          <p:cNvSpPr>
+            <a:spLocks noGrp="1"/>
+          </p:cNvSpPr>
+          <p:nvPr>
+            <p:ph type="title"/>
+          </p:nvPr>
+        </p:nvSpPr>
+        <p:spPr/>
+        <p:txBody>
+          <a:bodyPr/>
+          <a:lstStyle/>
+          <a:p>
+            <a:r>
+              <a:rPr lang="en-US" altLang="ko-KR" dirty="0"/>
+              <a:t>Ranking (The Degree of Accuracy)</a:t>
+            </a:r>
+            <a:endParaRPr lang="ko-KR" altLang="en-US" dirty="0"/>
+          </a:p>
+        </p:txBody>
+      </p:sp>
+      <mc:AlternateContent xmlns:mc="http://schemas.openxmlformats.org/markup-compatibility/2006" xmlns:a14="http://schemas.microsoft.com/office/drawing/2010/main">
+        <mc:Choice Requires="a14">
+          <p:sp>
+            <p:nvSpPr>
+              <p:cNvPr id="3" name="내용 개체 틀 2">
+                <a:extLst>
+                  <a:ext uri="{FF2B5EF4-FFF2-40B4-BE49-F238E27FC236}">
+                    <a16:creationId xmlns:a16="http://schemas.microsoft.com/office/drawing/2014/main" id="{F0967C54-D716-44A6-B7BE-43AA5427E333}"/>
+                  </a:ext>
+                </a:extLst>
+              </p:cNvPr>
+              <p:cNvSpPr>
+                <a:spLocks noGrp="1"/>
+              </p:cNvSpPr>
+              <p:nvPr>
+                <p:ph idx="1"/>
+              </p:nvPr>
+            </p:nvSpPr>
+            <p:spPr>
+              <a:xfrm>
+                <a:off x="827424" y="1967762"/>
+                <a:ext cx="10554574" cy="4890237"/>
+              </a:xfrm>
+            </p:spPr>
+            <p:txBody>
+              <a:bodyPr>
+                <a:normAutofit/>
+              </a:bodyPr>
+              <a:lstStyle/>
+              <a:p>
+                <a:r>
+                  <a:rPr lang="en-US" altLang="ko-KR" sz="2400" dirty="0"/>
+                  <a:t>Ranking Algorithm Plan</a:t>
+                </a:r>
+              </a:p>
+              <a:p>
+                <a14:m>
+                  <m:oMath xmlns:m="http://schemas.openxmlformats.org/officeDocument/2006/math">
+                    <m:sSub>
+                      <m:sSubPr>
+                        <m:ctrlPr>
+                          <a:rPr lang="en-US" altLang="ko-KR" sz="2800" b="0" i="1" smtClean="0">
+                            <a:latin typeface="Cambria Math" panose="02040503050406030204" pitchFamily="18" charset="0"/>
+                          </a:rPr>
+                        </m:ctrlPr>
+                      </m:sSubPr>
+                      <m:e>
+                        <m:r>
+                          <a:rPr lang="en-US" altLang="ko-KR" sz="2800" b="0" i="1" smtClean="0">
+                            <a:latin typeface="Cambria Math" panose="02040503050406030204" pitchFamily="18" charset="0"/>
+                          </a:rPr>
+                          <m:t>𝐷</m:t>
+                        </m:r>
+                      </m:e>
+                      <m:sub>
+                        <m:r>
+                          <a:rPr lang="en-US" altLang="ko-KR" sz="2800" b="0" i="1" smtClean="0">
+                            <a:latin typeface="Cambria Math" panose="02040503050406030204" pitchFamily="18" charset="0"/>
+                          </a:rPr>
+                          <m:t>𝑖</m:t>
+                        </m:r>
+                      </m:sub>
+                    </m:sSub>
+                    <m:r>
+                      <a:rPr lang="en-US" altLang="ko-KR" sz="2800" b="0" i="1" smtClean="0">
+                        <a:latin typeface="Cambria Math" panose="02040503050406030204" pitchFamily="18" charset="0"/>
+                      </a:rPr>
+                      <m:t>=</m:t>
+                    </m:r>
+                    <m:r>
+                      <m:rPr>
+                        <m:sty m:val="p"/>
+                      </m:rPr>
+                      <a:rPr lang="en-US" altLang="ko-KR" sz="2800" b="0" i="0" smtClean="0">
+                        <a:latin typeface="Cambria Math" panose="02040503050406030204" pitchFamily="18" charset="0"/>
+                      </a:rPr>
+                      <m:t>Σ</m:t>
+                    </m:r>
+                    <m:sSub>
+                      <m:sSubPr>
+                        <m:ctrlPr>
+                          <a:rPr lang="en-US" altLang="ko-KR" sz="2800" b="0" i="1" smtClean="0">
+                            <a:latin typeface="Cambria Math" panose="02040503050406030204" pitchFamily="18" charset="0"/>
+                          </a:rPr>
+                        </m:ctrlPr>
+                      </m:sSubPr>
+                      <m:e>
+                        <m:r>
+                          <m:rPr>
+                            <m:sty m:val="p"/>
+                          </m:rPr>
+                          <a:rPr lang="en-US" altLang="ko-KR" sz="2800" b="0" i="0" smtClean="0">
+                            <a:latin typeface="Cambria Math" panose="02040503050406030204" pitchFamily="18" charset="0"/>
+                          </a:rPr>
+                          <m:t>D</m:t>
+                        </m:r>
+                      </m:e>
+                      <m:sub>
+                        <m:sSub>
+                          <m:sSubPr>
+                            <m:ctrlPr>
+                              <a:rPr lang="en-US" altLang="ko-KR" sz="2800" b="0" i="1" smtClean="0">
+                                <a:latin typeface="Cambria Math" panose="02040503050406030204" pitchFamily="18" charset="0"/>
+                              </a:rPr>
+                            </m:ctrlPr>
+                          </m:sSubPr>
+                          <m:e>
+                            <m:r>
+                              <m:rPr>
+                                <m:sty m:val="p"/>
+                              </m:rPr>
+                              <a:rPr lang="en-US" altLang="ko-KR" sz="2800" b="0" i="0" smtClean="0">
+                                <a:latin typeface="Cambria Math" panose="02040503050406030204" pitchFamily="18" charset="0"/>
+                              </a:rPr>
+                              <m:t>s</m:t>
+                            </m:r>
+                          </m:e>
+                          <m:sub>
+                            <m:r>
+                              <m:rPr>
+                                <m:sty m:val="p"/>
+                              </m:rPr>
+                              <a:rPr lang="en-US" altLang="ko-KR" sz="2800" b="0" i="0" smtClean="0">
+                                <a:latin typeface="Cambria Math" panose="02040503050406030204" pitchFamily="18" charset="0"/>
+                              </a:rPr>
+                              <m:t>i</m:t>
+                            </m:r>
+                          </m:sub>
+                        </m:sSub>
+                      </m:sub>
+                    </m:sSub>
+                  </m:oMath>
+                </a14:m>
+                <a:endParaRPr lang="en-US" altLang="ko-KR" dirty="0"/>
+              </a:p>
+              <a:p>
+                <a14:m>
+                  <m:oMath xmlns:m="http://schemas.openxmlformats.org/officeDocument/2006/math">
+                    <m:sSub>
+                      <m:sSubPr>
+                        <m:ctrlPr>
+                          <a:rPr lang="en-US" altLang="ko-KR" b="0" i="1" smtClean="0">
+                            <a:latin typeface="Cambria Math" panose="02040503050406030204" pitchFamily="18" charset="0"/>
+                          </a:rPr>
+                        </m:ctrlPr>
+                      </m:sSubPr>
+                      <m:e>
+                        <m:r>
+                          <a:rPr lang="en-US" altLang="ko-KR" b="0" i="1" smtClean="0">
+                            <a:latin typeface="Cambria Math" panose="02040503050406030204" pitchFamily="18" charset="0"/>
+                          </a:rPr>
+                          <m:t>𝐷</m:t>
+                        </m:r>
+                      </m:e>
+                      <m:sub>
+                        <m:r>
+                          <a:rPr lang="en-US" altLang="ko-KR" b="0" i="1" smtClean="0">
+                            <a:latin typeface="Cambria Math" panose="02040503050406030204" pitchFamily="18" charset="0"/>
+                          </a:rPr>
+                          <m:t>𝑖</m:t>
+                        </m:r>
+                      </m:sub>
+                    </m:sSub>
+                    <m:r>
+                      <a:rPr lang="en-US" altLang="ko-KR" b="0" i="1" smtClean="0">
+                        <a:latin typeface="Cambria Math" panose="02040503050406030204" pitchFamily="18" charset="0"/>
+                      </a:rPr>
+                      <m:t>:</m:t>
+                    </m:r>
+                    <m:r>
+                      <a:rPr lang="en-US" altLang="ko-KR" b="0" i="1" smtClean="0">
+                        <a:latin typeface="Cambria Math" panose="02040503050406030204" pitchFamily="18" charset="0"/>
+                      </a:rPr>
+                      <m:t>𝑑𝑒𝑔𝑟𝑒𝑒</m:t>
+                    </m:r>
+                    <m:r>
+                      <a:rPr lang="en-US" altLang="ko-KR" b="0" i="1" smtClean="0">
+                        <a:latin typeface="Cambria Math" panose="02040503050406030204" pitchFamily="18" charset="0"/>
+                      </a:rPr>
+                      <m:t> </m:t>
+                    </m:r>
+                    <m:r>
+                      <a:rPr lang="en-US" altLang="ko-KR" b="0" i="1" smtClean="0">
+                        <a:latin typeface="Cambria Math" panose="02040503050406030204" pitchFamily="18" charset="0"/>
+                      </a:rPr>
+                      <m:t>𝑜𝑓</m:t>
+                    </m:r>
+                    <m:r>
+                      <a:rPr lang="en-US" altLang="ko-KR" b="0" i="1" smtClean="0">
+                        <a:latin typeface="Cambria Math" panose="02040503050406030204" pitchFamily="18" charset="0"/>
+                      </a:rPr>
+                      <m:t> </m:t>
+                    </m:r>
+                    <m:r>
+                      <a:rPr lang="en-US" altLang="ko-KR" b="0" i="1" smtClean="0">
+                        <a:latin typeface="Cambria Math" panose="02040503050406030204" pitchFamily="18" charset="0"/>
+                      </a:rPr>
+                      <m:t>𝑑𝑜𝑐𝑢𝑚𝑒𝑛𝑡</m:t>
+                    </m:r>
+                    <m:r>
+                      <a:rPr lang="en-US" altLang="ko-KR" b="0" i="1" smtClean="0">
+                        <a:latin typeface="Cambria Math" panose="02040503050406030204" pitchFamily="18" charset="0"/>
+                      </a:rPr>
+                      <m:t> </m:t>
+                    </m:r>
+                    <m:r>
+                      <a:rPr lang="en-US" altLang="ko-KR" b="0" i="1" smtClean="0">
+                        <a:latin typeface="Cambria Math" panose="02040503050406030204" pitchFamily="18" charset="0"/>
+                      </a:rPr>
+                      <m:t>𝑎𝑛𝑑</m:t>
+                    </m:r>
+                    <m:r>
+                      <a:rPr lang="en-US" altLang="ko-KR" b="0" i="1" smtClean="0">
+                        <a:latin typeface="Cambria Math" panose="02040503050406030204" pitchFamily="18" charset="0"/>
+                      </a:rPr>
+                      <m:t> </m:t>
+                    </m:r>
+                    <m:r>
+                      <a:rPr lang="en-US" altLang="ko-KR" b="0" i="1" smtClean="0">
+                        <a:latin typeface="Cambria Math" panose="02040503050406030204" pitchFamily="18" charset="0"/>
+                      </a:rPr>
+                      <m:t>𝑘𝑒𝑦𝑤𝑜𝑟𝑑</m:t>
+                    </m:r>
+                    <m:r>
+                      <a:rPr lang="en-US" altLang="ko-KR" b="0" i="1" smtClean="0">
+                        <a:latin typeface="Cambria Math" panose="02040503050406030204" pitchFamily="18" charset="0"/>
+                      </a:rPr>
+                      <m:t> </m:t>
+                    </m:r>
+                    <m:r>
+                      <a:rPr lang="en-US" altLang="ko-KR" b="0" i="1" smtClean="0">
+                        <a:latin typeface="Cambria Math" panose="02040503050406030204" pitchFamily="18" charset="0"/>
+                      </a:rPr>
+                      <m:t>𝑎𝑠𝑠𝑜𝑐𝑖𝑎𝑡𝑖𝑜𝑛</m:t>
+                    </m:r>
+                    <m:r>
+                      <a:rPr lang="en-US" altLang="ko-KR" b="0" i="1" smtClean="0">
+                        <a:latin typeface="Cambria Math" panose="02040503050406030204" pitchFamily="18" charset="0"/>
+                      </a:rPr>
+                      <m:t>, </m:t>
+                    </m:r>
+                  </m:oMath>
+                </a14:m>
+                <a:endParaRPr lang="en-US" altLang="ko-KR" b="0" i="1" dirty="0">
+                  <a:latin typeface="Cambria Math" panose="02040503050406030204" pitchFamily="18" charset="0"/>
+                </a:endParaRPr>
+              </a:p>
+              <a:p>
+                <a14:m>
+                  <m:oMath xmlns:m="http://schemas.openxmlformats.org/officeDocument/2006/math">
+                    <m:sSub>
+                      <m:sSubPr>
+                        <m:ctrlPr>
+                          <a:rPr lang="en-US" altLang="ko-KR" b="0" i="1" smtClean="0">
+                            <a:latin typeface="Cambria Math" panose="02040503050406030204" pitchFamily="18" charset="0"/>
+                          </a:rPr>
+                        </m:ctrlPr>
+                      </m:sSubPr>
+                      <m:e>
+                        <m:r>
+                          <a:rPr lang="en-US" altLang="ko-KR" b="0" i="1" smtClean="0">
+                            <a:latin typeface="Cambria Math" panose="02040503050406030204" pitchFamily="18" charset="0"/>
+                          </a:rPr>
+                          <m:t>𝐷</m:t>
+                        </m:r>
+                      </m:e>
+                      <m:sub>
+                        <m:sSub>
+                          <m:sSubPr>
+                            <m:ctrlPr>
+                              <a:rPr lang="en-US" altLang="ko-KR" b="0" i="1" smtClean="0">
+                                <a:latin typeface="Cambria Math" panose="02040503050406030204" pitchFamily="18" charset="0"/>
+                              </a:rPr>
+                            </m:ctrlPr>
+                          </m:sSubPr>
+                          <m:e>
+                            <m:r>
+                              <a:rPr lang="en-US" altLang="ko-KR" b="0" i="1" smtClean="0">
+                                <a:latin typeface="Cambria Math" panose="02040503050406030204" pitchFamily="18" charset="0"/>
+                              </a:rPr>
+                              <m:t>𝑠</m:t>
+                            </m:r>
+                          </m:e>
+                          <m:sub>
+                            <m:r>
+                              <a:rPr lang="en-US" altLang="ko-KR" b="0" i="1" smtClean="0">
+                                <a:latin typeface="Cambria Math" panose="02040503050406030204" pitchFamily="18" charset="0"/>
+                              </a:rPr>
+                              <m:t>𝑖</m:t>
+                            </m:r>
+                          </m:sub>
+                        </m:sSub>
+                      </m:sub>
+                    </m:sSub>
+                    <m:r>
+                      <a:rPr lang="en-US" altLang="ko-KR" b="0" i="1" smtClean="0">
+                        <a:latin typeface="Cambria Math" panose="02040503050406030204" pitchFamily="18" charset="0"/>
+                      </a:rPr>
+                      <m:t>:</m:t>
+                    </m:r>
+                    <m:r>
+                      <a:rPr lang="en-US" altLang="ko-KR" b="0" i="1" smtClean="0">
+                        <a:latin typeface="Cambria Math" panose="02040503050406030204" pitchFamily="18" charset="0"/>
+                      </a:rPr>
+                      <m:t>𝑑𝑒𝑔𝑟𝑒𝑒</m:t>
+                    </m:r>
+                    <m:r>
+                      <a:rPr lang="en-US" altLang="ko-KR" b="0" i="1" smtClean="0">
+                        <a:latin typeface="Cambria Math" panose="02040503050406030204" pitchFamily="18" charset="0"/>
+                      </a:rPr>
+                      <m:t> </m:t>
+                    </m:r>
+                    <m:r>
+                      <a:rPr lang="en-US" altLang="ko-KR" b="0" i="1" smtClean="0">
+                        <a:latin typeface="Cambria Math" panose="02040503050406030204" pitchFamily="18" charset="0"/>
+                      </a:rPr>
+                      <m:t>𝑜𝑓</m:t>
+                    </m:r>
+                    <m:r>
+                      <a:rPr lang="en-US" altLang="ko-KR" b="0" i="1" smtClean="0">
+                        <a:latin typeface="Cambria Math" panose="02040503050406030204" pitchFamily="18" charset="0"/>
+                      </a:rPr>
+                      <m:t> </m:t>
+                    </m:r>
+                    <m:r>
+                      <a:rPr lang="en-US" altLang="ko-KR" b="0" i="1" smtClean="0">
+                        <a:latin typeface="Cambria Math" panose="02040503050406030204" pitchFamily="18" charset="0"/>
+                      </a:rPr>
+                      <m:t>𝑐𝑜𝑟𝑟𝑒𝑙𝑎𝑡𝑖𝑜𝑛</m:t>
+                    </m:r>
+                    <m:r>
+                      <a:rPr lang="en-US" altLang="ko-KR" b="0" i="1" smtClean="0">
+                        <a:latin typeface="Cambria Math" panose="02040503050406030204" pitchFamily="18" charset="0"/>
+                      </a:rPr>
+                      <m:t> </m:t>
+                    </m:r>
+                    <m:r>
+                      <a:rPr lang="en-US" altLang="ko-KR" b="0" i="1" smtClean="0">
+                        <a:latin typeface="Cambria Math" panose="02040503050406030204" pitchFamily="18" charset="0"/>
+                      </a:rPr>
+                      <m:t>𝑏𝑒𝑡𝑤𝑒𝑒𝑛</m:t>
+                    </m:r>
+                    <m:r>
+                      <a:rPr lang="en-US" altLang="ko-KR" b="0" i="1" smtClean="0">
+                        <a:latin typeface="Cambria Math" panose="02040503050406030204" pitchFamily="18" charset="0"/>
+                      </a:rPr>
+                      <m:t> </m:t>
+                    </m:r>
+                    <m:r>
+                      <a:rPr lang="en-US" altLang="ko-KR" b="0" i="1" smtClean="0">
+                        <a:latin typeface="Cambria Math" panose="02040503050406030204" pitchFamily="18" charset="0"/>
+                      </a:rPr>
+                      <m:t>𝑤𝑜𝑟𝑑</m:t>
+                    </m:r>
+                    <m:r>
+                      <a:rPr lang="en-US" altLang="ko-KR" b="0" i="1" smtClean="0">
+                        <a:latin typeface="Cambria Math" panose="02040503050406030204" pitchFamily="18" charset="0"/>
+                      </a:rPr>
+                      <m:t> </m:t>
+                    </m:r>
+                    <m:r>
+                      <a:rPr lang="en-US" altLang="ko-KR" b="0" i="1" smtClean="0">
+                        <a:latin typeface="Cambria Math" panose="02040503050406030204" pitchFamily="18" charset="0"/>
+                      </a:rPr>
+                      <m:t>𝑎𝑛𝑑</m:t>
+                    </m:r>
+                    <m:r>
+                      <a:rPr lang="en-US" altLang="ko-KR" b="0" i="1" smtClean="0">
+                        <a:latin typeface="Cambria Math" panose="02040503050406030204" pitchFamily="18" charset="0"/>
+                      </a:rPr>
+                      <m:t> </m:t>
+                    </m:r>
+                    <m:r>
+                      <a:rPr lang="en-US" altLang="ko-KR" b="0" i="1" smtClean="0">
+                        <a:latin typeface="Cambria Math" panose="02040503050406030204" pitchFamily="18" charset="0"/>
+                      </a:rPr>
+                      <m:t>𝑠𝑒𝑛𝑡𝑒𝑛𝑐𝑒</m:t>
+                    </m:r>
+                    <m:r>
+                      <a:rPr lang="en-US" altLang="ko-KR" b="0" i="1" smtClean="0">
+                        <a:latin typeface="Cambria Math" panose="02040503050406030204" pitchFamily="18" charset="0"/>
+                      </a:rPr>
+                      <m:t> </m:t>
+                    </m:r>
+                    <m:r>
+                      <a:rPr lang="en-US" altLang="ko-KR" b="0" i="1" smtClean="0">
+                        <a:latin typeface="Cambria Math" panose="02040503050406030204" pitchFamily="18" charset="0"/>
+                      </a:rPr>
+                      <m:t>𝑤𝑖𝑡h</m:t>
+                    </m:r>
+                    <m:r>
+                      <a:rPr lang="en-US" altLang="ko-KR" b="0" i="1" smtClean="0">
+                        <a:latin typeface="Cambria Math" panose="02040503050406030204" pitchFamily="18" charset="0"/>
+                      </a:rPr>
+                      <m:t> </m:t>
+                    </m:r>
+                    <m:r>
+                      <a:rPr lang="en-US" altLang="ko-KR" b="0" i="1" smtClean="0">
+                        <a:latin typeface="Cambria Math" panose="02040503050406030204" pitchFamily="18" charset="0"/>
+                      </a:rPr>
+                      <m:t>𝑤𝑜𝑟𝑑𝑠</m:t>
+                    </m:r>
+                  </m:oMath>
+                </a14:m>
+                <a:endParaRPr lang="en-US" altLang="ko-KR" b="0" i="1" dirty="0">
+                  <a:latin typeface="Cambria Math" panose="02040503050406030204" pitchFamily="18" charset="0"/>
+                </a:endParaRPr>
+              </a:p>
+              <a:p>
+                <a14:m>
+                  <m:oMath xmlns:m="http://schemas.openxmlformats.org/officeDocument/2006/math">
+                    <m:sSub>
+                      <m:sSubPr>
+                        <m:ctrlPr>
+                          <a:rPr lang="en-US" altLang="ko-KR" b="0" i="1" smtClean="0">
+                            <a:latin typeface="Cambria Math" panose="02040503050406030204" pitchFamily="18" charset="0"/>
+                          </a:rPr>
+                        </m:ctrlPr>
+                      </m:sSubPr>
+                      <m:e>
+                        <m:r>
+                          <a:rPr lang="en-US" altLang="ko-KR" b="0" i="1" smtClean="0">
+                            <a:latin typeface="Cambria Math" panose="02040503050406030204" pitchFamily="18" charset="0"/>
+                          </a:rPr>
+                          <m:t>𝐷</m:t>
+                        </m:r>
+                      </m:e>
+                      <m:sub>
+                        <m:sSub>
+                          <m:sSubPr>
+                            <m:ctrlPr>
+                              <a:rPr lang="en-US" altLang="ko-KR" b="0" i="1" smtClean="0">
+                                <a:latin typeface="Cambria Math" panose="02040503050406030204" pitchFamily="18" charset="0"/>
+                              </a:rPr>
+                            </m:ctrlPr>
+                          </m:sSubPr>
+                          <m:e>
+                            <m:r>
+                              <a:rPr lang="en-US" altLang="ko-KR" b="0" i="1" smtClean="0">
+                                <a:latin typeface="Cambria Math" panose="02040503050406030204" pitchFamily="18" charset="0"/>
+                              </a:rPr>
+                              <m:t>𝑠</m:t>
+                            </m:r>
+                          </m:e>
+                          <m:sub>
+                            <m:r>
+                              <a:rPr lang="en-US" altLang="ko-KR" b="0" i="1" smtClean="0">
+                                <a:latin typeface="Cambria Math" panose="02040503050406030204" pitchFamily="18" charset="0"/>
+                              </a:rPr>
+                              <m:t>𝑖</m:t>
+                            </m:r>
+                          </m:sub>
+                        </m:sSub>
+                      </m:sub>
+                    </m:sSub>
+                    <m:r>
+                      <a:rPr lang="en-US" altLang="ko-KR" b="0" i="1" smtClean="0">
+                        <a:latin typeface="Cambria Math" panose="02040503050406030204" pitchFamily="18" charset="0"/>
+                      </a:rPr>
+                      <m:t>=</m:t>
+                    </m:r>
+                    <m:r>
+                      <a:rPr lang="en-US" altLang="ko-KR" b="0" i="1" smtClean="0">
+                        <a:latin typeface="Cambria Math" panose="02040503050406030204" pitchFamily="18" charset="0"/>
+                      </a:rPr>
+                      <m:t>𝑊𝑋</m:t>
+                    </m:r>
+                  </m:oMath>
+                </a14:m>
+                <a:r>
+                  <a:rPr lang="ko-KR" altLang="en-US" dirty="0"/>
+                  <a:t> </a:t>
+                </a:r>
+                <a:r>
+                  <a:rPr lang="en-US" altLang="ko-KR" dirty="0"/>
+                  <a:t>(W : weight of element, </a:t>
+                </a:r>
+              </a:p>
+              <a:p>
+                <a:pPr marL="0" indent="0">
+                  <a:buNone/>
+                </a:pPr>
+                <a:r>
+                  <a:rPr lang="en-US" altLang="ko-KR" dirty="0"/>
+                  <a:t>	X include</a:t>
+                </a:r>
+                <a:r>
+                  <a:rPr lang="ko-KR" altLang="en-US" dirty="0"/>
+                  <a:t> </a:t>
+                </a:r>
+                <a:r>
+                  <a:rPr lang="en-US" altLang="ko-KR" dirty="0"/>
+                  <a:t>Frequency of keyword, whether it is derivative, position of keyword and so on.)</a:t>
+                </a:r>
+              </a:p>
+              <a:p>
+                <a:r>
+                  <a:rPr lang="en-US" altLang="ko-KR" dirty="0"/>
+                  <a:t>Still looking for elements of X. </a:t>
+                </a:r>
+              </a:p>
+              <a:p>
+                <a:r>
+                  <a:rPr lang="en-US" altLang="ko-KR" dirty="0"/>
+                  <a:t>Because the frequency of keywords is small, I think I do not have to worry about the time complexity of the ranking algorithm.</a:t>
+                </a:r>
+              </a:p>
+            </p:txBody>
+          </p:sp>
+        </mc:Choice>
+        <mc:Fallback xmlns="">
           <p:sp>
             <p:nvSpPr>
               <p:cNvPr id="3" name="내용 개체 틀 2">
@@ -10254,96 +11817,6 @@
 </p:sld>
 </file>
 
-<file path=ppt/slides/slide8.xml><?xml version="1.0" encoding="utf-8"?>
-<p:sld xmlns:a="http://schemas.openxmlformats.org/drawingml/2006/main" xmlns:r="http://schemas.openxmlformats.org/officeDocument/2006/relationships" xmlns:p="http://schemas.openxmlformats.org/presentationml/2006/main">
-  <p:cSld>
-    <p:spTree>
-      <p:nvGrpSpPr>
-        <p:cNvPr id="1" name=""/>
-        <p:cNvGrpSpPr/>
-        <p:nvPr/>
-      </p:nvGrpSpPr>
-      <p:grpSpPr>
-        <a:xfrm>
-          <a:off x="0" y="0"/>
-          <a:ext cx="0" cy="0"/>
-          <a:chOff x="0" y="0"/>
-          <a:chExt cx="0" cy="0"/>
-        </a:xfrm>
-      </p:grpSpPr>
-      <p:sp>
-        <p:nvSpPr>
-          <p:cNvPr id="2" name="제목 1">
-            <a:extLst>
-              <a:ext uri="{FF2B5EF4-FFF2-40B4-BE49-F238E27FC236}">
-                <a16:creationId xmlns:a16="http://schemas.microsoft.com/office/drawing/2014/main" id="{252CC343-FB05-41BD-870B-E84645846DE8}"/>
-              </a:ext>
-            </a:extLst>
-          </p:cNvPr>
-          <p:cNvSpPr>
-            <a:spLocks noGrp="1"/>
-          </p:cNvSpPr>
-          <p:nvPr>
-            <p:ph type="title"/>
-          </p:nvPr>
-        </p:nvSpPr>
-        <p:spPr/>
-        <p:txBody>
-          <a:bodyPr/>
-          <a:lstStyle/>
-          <a:p>
-            <a:r>
-              <a:rPr lang="en-US" altLang="ko-KR" dirty="0"/>
-              <a:t>Sorting</a:t>
-            </a:r>
-            <a:endParaRPr lang="ko-KR" altLang="en-US" dirty="0"/>
-          </a:p>
-        </p:txBody>
-      </p:sp>
-      <p:sp>
-        <p:nvSpPr>
-          <p:cNvPr id="3" name="내용 개체 틀 2">
-            <a:extLst>
-              <a:ext uri="{FF2B5EF4-FFF2-40B4-BE49-F238E27FC236}">
-                <a16:creationId xmlns:a16="http://schemas.microsoft.com/office/drawing/2014/main" id="{FF45B482-D2A8-427B-868F-D91C7CA1A73F}"/>
-              </a:ext>
-            </a:extLst>
-          </p:cNvPr>
-          <p:cNvSpPr>
-            <a:spLocks noGrp="1"/>
-          </p:cNvSpPr>
-          <p:nvPr>
-            <p:ph idx="1"/>
-          </p:nvPr>
-        </p:nvSpPr>
-        <p:spPr/>
-        <p:txBody>
-          <a:bodyPr>
-            <a:normAutofit/>
-          </a:bodyPr>
-          <a:lstStyle/>
-          <a:p>
-            <a:r>
-              <a:rPr lang="en-US" altLang="ko-KR" sz="2400" dirty="0"/>
-              <a:t>Because of Linked List, I use merge sort algorithm.</a:t>
-            </a:r>
-            <a:endParaRPr lang="ko-KR" altLang="en-US" sz="2400" dirty="0"/>
-          </a:p>
-        </p:txBody>
-      </p:sp>
-    </p:spTree>
-    <p:extLst>
-      <p:ext uri="{BB962C8B-B14F-4D97-AF65-F5344CB8AC3E}">
-        <p14:creationId xmlns:p14="http://schemas.microsoft.com/office/powerpoint/2010/main" val="927733905"/>
-      </p:ext>
-    </p:extLst>
-  </p:cSld>
-  <p:clrMapOvr>
-    <a:masterClrMapping/>
-  </p:clrMapOvr>
-</p:sld>
-</file>
-
 <file path=ppt/slides/slide9.xml><?xml version="1.0" encoding="utf-8"?>
 <p:sld xmlns:a="http://schemas.openxmlformats.org/drawingml/2006/main" xmlns:r="http://schemas.openxmlformats.org/officeDocument/2006/relationships" xmlns:p="http://schemas.openxmlformats.org/presentationml/2006/main">
   <p:cSld>
@@ -10366,7 +11839,7 @@
           <p:cNvPr id="2" name="제목 1">
             <a:extLst>
               <a:ext uri="{FF2B5EF4-FFF2-40B4-BE49-F238E27FC236}">
-                <a16:creationId xmlns:a16="http://schemas.microsoft.com/office/drawing/2014/main" id="{F0FDDCD6-A14C-4889-95C7-3B155DF6D798}"/>
+                <a16:creationId xmlns:a16="http://schemas.microsoft.com/office/drawing/2014/main" id="{252CC343-FB05-41BD-870B-E84645846DE8}"/>
               </a:ext>
             </a:extLst>
           </p:cNvPr>
@@ -10384,48 +11857,18 @@
           <a:p>
             <a:r>
               <a:rPr lang="en-US" altLang="ko-KR" dirty="0"/>
-              <a:t>Is it really possible? (Scale Issue)</a:t>
+              <a:t>Sorting</a:t>
             </a:r>
             <a:endParaRPr lang="ko-KR" altLang="en-US" dirty="0"/>
           </a:p>
         </p:txBody>
       </p:sp>
-      <p:pic>
-        <p:nvPicPr>
-          <p:cNvPr id="5" name="그림 4">
+      <p:sp>
+        <p:nvSpPr>
+          <p:cNvPr id="3" name="내용 개체 틀 2">
             <a:extLst>
               <a:ext uri="{FF2B5EF4-FFF2-40B4-BE49-F238E27FC236}">
-                <a16:creationId xmlns:a16="http://schemas.microsoft.com/office/drawing/2014/main" id="{8B62223C-5A96-40B2-BA37-81193B6DA458}"/>
-              </a:ext>
-            </a:extLst>
-          </p:cNvPr>
-          <p:cNvPicPr>
-            <a:picLocks noChangeAspect="1"/>
-          </p:cNvPicPr>
-          <p:nvPr/>
-        </p:nvPicPr>
-        <p:blipFill>
-          <a:blip r:embed="rId2"/>
-          <a:stretch>
-            <a:fillRect/>
-          </a:stretch>
-        </p:blipFill>
-        <p:spPr>
-          <a:xfrm>
-            <a:off x="4101786" y="3335494"/>
-            <a:ext cx="6319155" cy="3404671"/>
-          </a:xfrm>
-          <a:prstGeom prst="rect">
-            <a:avLst/>
-          </a:prstGeom>
-        </p:spPr>
-      </p:pic>
-      <p:sp>
-        <p:nvSpPr>
-          <p:cNvPr id="7" name="내용 개체 틀 6">
-            <a:extLst>
-              <a:ext uri="{FF2B5EF4-FFF2-40B4-BE49-F238E27FC236}">
-                <a16:creationId xmlns:a16="http://schemas.microsoft.com/office/drawing/2014/main" id="{44EF9BD7-007A-4140-B8EF-635A84C90C69}"/>
+                <a16:creationId xmlns:a16="http://schemas.microsoft.com/office/drawing/2014/main" id="{FF45B482-D2A8-427B-868F-D91C7CA1A73F}"/>
               </a:ext>
             </a:extLst>
           </p:cNvPr>
@@ -10436,51 +11879,33 @@
             <p:ph idx="1"/>
           </p:nvPr>
         </p:nvSpPr>
-        <p:spPr>
-          <a:xfrm>
-            <a:off x="810000" y="1228009"/>
-            <a:ext cx="6583575" cy="3636511"/>
-          </a:xfrm>
-        </p:spPr>
+        <p:spPr/>
         <p:txBody>
-          <a:bodyPr/>
+          <a:bodyPr>
+            <a:normAutofit/>
+          </a:bodyPr>
           <a:lstStyle/>
           <a:p>
             <a:r>
-              <a:rPr lang="en-US" altLang="ko-KR" dirty="0"/>
-              <a:t>Toy Test</a:t>
-            </a:r>
-          </a:p>
-          <a:p>
-            <a:r>
-              <a:rPr lang="en-US" altLang="ko-KR" dirty="0"/>
-              <a:t>The length of time it takes to simply find?</a:t>
-            </a:r>
-          </a:p>
-          <a:p>
-            <a:r>
-              <a:rPr lang="en-US" altLang="ko-KR" dirty="0"/>
-              <a:t>(The decimal precision is up to the fifth decimal place.)</a:t>
-            </a:r>
-          </a:p>
-          <a:p>
-            <a:r>
-              <a:rPr lang="en-US" altLang="ko-KR" dirty="0"/>
-              <a:t>0.00405 (in Debug)</a:t>
-            </a:r>
-          </a:p>
-          <a:p>
-            <a:r>
-              <a:rPr lang="en-US" altLang="ko-KR" dirty="0"/>
-              <a:t>0.00101 (in Release)</a:t>
-            </a:r>
+              <a:rPr lang="en-US" altLang="ko-KR" sz="2400" dirty="0"/>
+              <a:t>I use </a:t>
+            </a:r>
+            <a:r>
+              <a:rPr lang="en-US" altLang="ko-KR" sz="2400" dirty="0" err="1"/>
+              <a:t>qsort</a:t>
+            </a:r>
+            <a:r>
+              <a:rPr lang="en-US" altLang="ko-KR" sz="2400" dirty="0"/>
+              <a:t>.</a:t>
+            </a:r>
+            <a:endParaRPr lang="ko-KR" altLang="en-US" sz="2400" dirty="0"/>
           </a:p>
         </p:txBody>
       </p:sp>
     </p:spTree>
     <p:extLst>
       <p:ext uri="{BB962C8B-B14F-4D97-AF65-F5344CB8AC3E}">
-        <p14:creationId xmlns:p14="http://schemas.microsoft.com/office/powerpoint/2010/main" val="2095903882"/>
+        <p14:creationId xmlns:p14="http://schemas.microsoft.com/office/powerpoint/2010/main" val="927733905"/>
       </p:ext>
     </p:extLst>
   </p:cSld>

</xml_diff>